<commit_message>
refactored all the code
</commit_message>
<xml_diff>
--- a/litorshiticons.pptx
+++ b/litorshiticons.pptx
@@ -8,6 +8,7 @@
     <p:sldId id="256" r:id="rId2"/>
     <p:sldId id="257" r:id="rId3"/>
     <p:sldId id="258" r:id="rId4"/>
+    <p:sldId id="259" r:id="rId5"/>
   </p:sldIdLst>
   <p:sldSz cx="12192000" cy="6858000"/>
   <p:notesSz cx="6858000" cy="9144000"/>
@@ -261,7 +262,7 @@
           <a:p>
             <a:fld id="{6FE6319C-EC6B-2F49-A488-C10CCF64866F}" type="datetimeFigureOut">
               <a:rPr lang="en-US" smtClean="0"/>
-              <a:t>5/7/19</a:t>
+              <a:t>5/11/19</a:t>
             </a:fld>
             <a:endParaRPr lang="en-US"/>
           </a:p>
@@ -459,7 +460,7 @@
           <a:p>
             <a:fld id="{6FE6319C-EC6B-2F49-A488-C10CCF64866F}" type="datetimeFigureOut">
               <a:rPr lang="en-US" smtClean="0"/>
-              <a:t>5/7/19</a:t>
+              <a:t>5/11/19</a:t>
             </a:fld>
             <a:endParaRPr lang="en-US"/>
           </a:p>
@@ -667,7 +668,7 @@
           <a:p>
             <a:fld id="{6FE6319C-EC6B-2F49-A488-C10CCF64866F}" type="datetimeFigureOut">
               <a:rPr lang="en-US" smtClean="0"/>
-              <a:t>5/7/19</a:t>
+              <a:t>5/11/19</a:t>
             </a:fld>
             <a:endParaRPr lang="en-US"/>
           </a:p>
@@ -865,7 +866,7 @@
           <a:p>
             <a:fld id="{6FE6319C-EC6B-2F49-A488-C10CCF64866F}" type="datetimeFigureOut">
               <a:rPr lang="en-US" smtClean="0"/>
-              <a:t>5/7/19</a:t>
+              <a:t>5/11/19</a:t>
             </a:fld>
             <a:endParaRPr lang="en-US"/>
           </a:p>
@@ -1140,7 +1141,7 @@
           <a:p>
             <a:fld id="{6FE6319C-EC6B-2F49-A488-C10CCF64866F}" type="datetimeFigureOut">
               <a:rPr lang="en-US" smtClean="0"/>
-              <a:t>5/7/19</a:t>
+              <a:t>5/11/19</a:t>
             </a:fld>
             <a:endParaRPr lang="en-US"/>
           </a:p>
@@ -1405,7 +1406,7 @@
           <a:p>
             <a:fld id="{6FE6319C-EC6B-2F49-A488-C10CCF64866F}" type="datetimeFigureOut">
               <a:rPr lang="en-US" smtClean="0"/>
-              <a:t>5/7/19</a:t>
+              <a:t>5/11/19</a:t>
             </a:fld>
             <a:endParaRPr lang="en-US"/>
           </a:p>
@@ -1817,7 +1818,7 @@
           <a:p>
             <a:fld id="{6FE6319C-EC6B-2F49-A488-C10CCF64866F}" type="datetimeFigureOut">
               <a:rPr lang="en-US" smtClean="0"/>
-              <a:t>5/7/19</a:t>
+              <a:t>5/11/19</a:t>
             </a:fld>
             <a:endParaRPr lang="en-US"/>
           </a:p>
@@ -1958,7 +1959,7 @@
           <a:p>
             <a:fld id="{6FE6319C-EC6B-2F49-A488-C10CCF64866F}" type="datetimeFigureOut">
               <a:rPr lang="en-US" smtClean="0"/>
-              <a:t>5/7/19</a:t>
+              <a:t>5/11/19</a:t>
             </a:fld>
             <a:endParaRPr lang="en-US"/>
           </a:p>
@@ -2071,7 +2072,7 @@
           <a:p>
             <a:fld id="{6FE6319C-EC6B-2F49-A488-C10CCF64866F}" type="datetimeFigureOut">
               <a:rPr lang="en-US" smtClean="0"/>
-              <a:t>5/7/19</a:t>
+              <a:t>5/11/19</a:t>
             </a:fld>
             <a:endParaRPr lang="en-US"/>
           </a:p>
@@ -2382,7 +2383,7 @@
           <a:p>
             <a:fld id="{6FE6319C-EC6B-2F49-A488-C10CCF64866F}" type="datetimeFigureOut">
               <a:rPr lang="en-US" smtClean="0"/>
-              <a:t>5/7/19</a:t>
+              <a:t>5/11/19</a:t>
             </a:fld>
             <a:endParaRPr lang="en-US"/>
           </a:p>
@@ -2670,7 +2671,7 @@
           <a:p>
             <a:fld id="{6FE6319C-EC6B-2F49-A488-C10CCF64866F}" type="datetimeFigureOut">
               <a:rPr lang="en-US" smtClean="0"/>
-              <a:t>5/7/19</a:t>
+              <a:t>5/11/19</a:t>
             </a:fld>
             <a:endParaRPr lang="en-US"/>
           </a:p>
@@ -2911,7 +2912,7 @@
           <a:p>
             <a:fld id="{6FE6319C-EC6B-2F49-A488-C10CCF64866F}" type="datetimeFigureOut">
               <a:rPr lang="en-US" smtClean="0"/>
-              <a:t>5/7/19</a:t>
+              <a:t>5/11/19</a:t>
             </a:fld>
             <a:endParaRPr lang="en-US"/>
           </a:p>
@@ -7398,64 +7399,12 @@
           </p:grpSp>
         </p:grpSp>
       </p:grpSp>
-      <p:sp>
-        <p:nvSpPr>
-          <p:cNvPr id="117" name="Rectangle 116">
-            <a:extLst>
-              <a:ext uri="{FF2B5EF4-FFF2-40B4-BE49-F238E27FC236}">
-                <a16:creationId xmlns:a16="http://schemas.microsoft.com/office/drawing/2014/main" id="{44761BFB-918F-7943-A3F7-129CAE61647F}"/>
-              </a:ext>
-            </a:extLst>
-          </p:cNvPr>
-          <p:cNvSpPr/>
-          <p:nvPr/>
-        </p:nvSpPr>
-        <p:spPr>
-          <a:xfrm>
-            <a:off x="9312874" y="3358999"/>
-            <a:ext cx="466315" cy="1799885"/>
-          </a:xfrm>
-          <a:prstGeom prst="rect">
-            <a:avLst/>
-          </a:prstGeom>
-          <a:solidFill>
-            <a:srgbClr val="F6B759"/>
-          </a:solidFill>
-          <a:ln>
-            <a:noFill/>
-          </a:ln>
-        </p:spPr>
-        <p:style>
-          <a:lnRef idx="2">
-            <a:schemeClr val="accent1">
-              <a:shade val="50000"/>
-            </a:schemeClr>
-          </a:lnRef>
-          <a:fillRef idx="1">
-            <a:schemeClr val="accent1"/>
-          </a:fillRef>
-          <a:effectRef idx="0">
-            <a:schemeClr val="accent1"/>
-          </a:effectRef>
-          <a:fontRef idx="minor">
-            <a:schemeClr val="lt1"/>
-          </a:fontRef>
-        </p:style>
-        <p:txBody>
-          <a:bodyPr rtlCol="0" anchor="ctr"/>
-          <a:lstStyle/>
-          <a:p>
-            <a:pPr algn="ctr"/>
-            <a:endParaRPr lang="en-US" dirty="0"/>
-          </a:p>
-        </p:txBody>
-      </p:sp>
       <p:grpSp>
         <p:nvGrpSpPr>
-          <p:cNvPr id="128" name="Group 127">
-            <a:extLst>
-              <a:ext uri="{FF2B5EF4-FFF2-40B4-BE49-F238E27FC236}">
-                <a16:creationId xmlns:a16="http://schemas.microsoft.com/office/drawing/2014/main" id="{5001CCF0-96DC-3A4C-BFD4-5E6B34EDB9F9}"/>
+          <p:cNvPr id="2" name="Group 1">
+            <a:extLst>
+              <a:ext uri="{FF2B5EF4-FFF2-40B4-BE49-F238E27FC236}">
+                <a16:creationId xmlns:a16="http://schemas.microsoft.com/office/drawing/2014/main" id="{5E3ACBBD-6C3B-804D-AD8D-520F93D81464}"/>
               </a:ext>
             </a:extLst>
           </p:cNvPr>
@@ -7464,12 +7413,64 @@
         </p:nvGrpSpPr>
         <p:grpSpPr>
           <a:xfrm>
-            <a:off x="8343329" y="2439902"/>
-            <a:ext cx="2817682" cy="3384066"/>
-            <a:chOff x="2732504" y="740170"/>
-            <a:chExt cx="2817682" cy="3384066"/>
+            <a:off x="8343328" y="1388265"/>
+            <a:ext cx="3723165" cy="4435701"/>
+            <a:chOff x="8343329" y="2467040"/>
+            <a:chExt cx="2817682" cy="3356928"/>
           </a:xfrm>
         </p:grpSpPr>
+        <p:sp>
+          <p:nvSpPr>
+            <p:cNvPr id="117" name="Rectangle 116">
+              <a:extLst>
+                <a:ext uri="{FF2B5EF4-FFF2-40B4-BE49-F238E27FC236}">
+                  <a16:creationId xmlns:a16="http://schemas.microsoft.com/office/drawing/2014/main" id="{44761BFB-918F-7943-A3F7-129CAE61647F}"/>
+                </a:ext>
+              </a:extLst>
+            </p:cNvPr>
+            <p:cNvSpPr/>
+            <p:nvPr/>
+          </p:nvSpPr>
+          <p:spPr>
+            <a:xfrm>
+              <a:off x="9312874" y="3358999"/>
+              <a:ext cx="466315" cy="1799885"/>
+            </a:xfrm>
+            <a:prstGeom prst="rect">
+              <a:avLst/>
+            </a:prstGeom>
+            <a:solidFill>
+              <a:srgbClr val="F6B759"/>
+            </a:solidFill>
+            <a:ln>
+              <a:noFill/>
+            </a:ln>
+          </p:spPr>
+          <p:style>
+            <a:lnRef idx="2">
+              <a:schemeClr val="accent1">
+                <a:shade val="50000"/>
+              </a:schemeClr>
+            </a:lnRef>
+            <a:fillRef idx="1">
+              <a:schemeClr val="accent1"/>
+            </a:fillRef>
+            <a:effectRef idx="0">
+              <a:schemeClr val="accent1"/>
+            </a:effectRef>
+            <a:fontRef idx="minor">
+              <a:schemeClr val="lt1"/>
+            </a:fontRef>
+          </p:style>
+          <p:txBody>
+            <a:bodyPr rtlCol="0" anchor="ctr"/>
+            <a:lstStyle/>
+            <a:p>
+              <a:pPr algn="ctr"/>
+              <a:endParaRPr lang="en-US" dirty="0"/>
+            </a:p>
+          </p:txBody>
+        </p:sp>
         <p:sp>
           <p:nvSpPr>
             <p:cNvPr id="129" name="Rectangle 128">
@@ -7484,7 +7485,7 @@
           </p:nvSpPr>
           <p:spPr>
             <a:xfrm>
-              <a:off x="3726413" y="2111308"/>
+              <a:off x="9337238" y="3811040"/>
               <a:ext cx="556220" cy="763820"/>
             </a:xfrm>
             <a:prstGeom prst="rect">
@@ -7550,7 +7551,7 @@
           </p:blipFill>
           <p:spPr>
             <a:xfrm>
-              <a:off x="3183372" y="740170"/>
+              <a:off x="8794197" y="2467040"/>
               <a:ext cx="2121387" cy="1936259"/>
             </a:xfrm>
             <a:prstGeom prst="rect">
@@ -7586,7 +7587,7 @@
           </p:blipFill>
           <p:spPr>
             <a:xfrm>
-              <a:off x="3750301" y="2111308"/>
+              <a:off x="9361126" y="3811040"/>
               <a:ext cx="1799885" cy="1799885"/>
             </a:xfrm>
             <a:prstGeom prst="rect">
@@ -7622,7 +7623,7 @@
           </p:blipFill>
           <p:spPr>
             <a:xfrm>
-              <a:off x="2732504" y="2105321"/>
+              <a:off x="8343329" y="3805053"/>
               <a:ext cx="1799885" cy="1799885"/>
             </a:xfrm>
             <a:prstGeom prst="rect">
@@ -7658,7 +7659,7 @@
           </p:blipFill>
           <p:spPr>
             <a:xfrm>
-              <a:off x="3136284" y="2111308"/>
+              <a:off x="8747109" y="3811040"/>
               <a:ext cx="2012928" cy="2012928"/>
             </a:xfrm>
             <a:prstGeom prst="rect">
@@ -7697,12 +7698,420 @@
           <a:chExt cx="0" cy="0"/>
         </a:xfrm>
       </p:grpSpPr>
+      <p:pic>
+        <p:nvPicPr>
+          <p:cNvPr id="43" name="Graphic 42" descr="Fire">
+            <a:extLst>
+              <a:ext uri="{FF2B5EF4-FFF2-40B4-BE49-F238E27FC236}">
+                <a16:creationId xmlns:a16="http://schemas.microsoft.com/office/drawing/2014/main" id="{ECCED1E5-52EE-664D-B319-B88460D2CA7C}"/>
+              </a:ext>
+            </a:extLst>
+          </p:cNvPr>
+          <p:cNvPicPr>
+            <a:picLocks noChangeAspect="1"/>
+          </p:cNvPicPr>
+          <p:nvPr/>
+        </p:nvPicPr>
+        <p:blipFill>
+          <a:blip r:embed="rId2">
+            <a:extLst>
+              <a:ext uri="{96DAC541-7B7A-43D3-8B79-37D633B846F1}">
+                <asvg:svgBlip xmlns:asvg="http://schemas.microsoft.com/office/drawing/2016/SVG/main" r:embed="rId3"/>
+              </a:ext>
+            </a:extLst>
+          </a:blip>
+          <a:stretch>
+            <a:fillRect/>
+          </a:stretch>
+        </p:blipFill>
+        <p:spPr>
+          <a:xfrm>
+            <a:off x="8269980" y="2942894"/>
+            <a:ext cx="2392673" cy="2183871"/>
+          </a:xfrm>
+          <a:prstGeom prst="rect">
+            <a:avLst/>
+          </a:prstGeom>
+        </p:spPr>
+      </p:pic>
+      <p:sp>
+        <p:nvSpPr>
+          <p:cNvPr id="19" name="Rectangle 18">
+            <a:extLst>
+              <a:ext uri="{FF2B5EF4-FFF2-40B4-BE49-F238E27FC236}">
+                <a16:creationId xmlns:a16="http://schemas.microsoft.com/office/drawing/2014/main" id="{23100E99-CF6C-6340-8416-8B8D8668A095}"/>
+              </a:ext>
+            </a:extLst>
+          </p:cNvPr>
+          <p:cNvSpPr/>
+          <p:nvPr/>
+        </p:nvSpPr>
+        <p:spPr>
+          <a:xfrm>
+            <a:off x="7677594" y="4121783"/>
+            <a:ext cx="497861" cy="763820"/>
+          </a:xfrm>
+          <a:prstGeom prst="rect">
+            <a:avLst/>
+          </a:prstGeom>
+          <a:solidFill>
+            <a:srgbClr val="F6B759"/>
+          </a:solidFill>
+          <a:ln>
+            <a:noFill/>
+          </a:ln>
+        </p:spPr>
+        <p:style>
+          <a:lnRef idx="2">
+            <a:schemeClr val="accent1">
+              <a:shade val="50000"/>
+            </a:schemeClr>
+          </a:lnRef>
+          <a:fillRef idx="1">
+            <a:schemeClr val="accent1"/>
+          </a:fillRef>
+          <a:effectRef idx="0">
+            <a:schemeClr val="accent1"/>
+          </a:effectRef>
+          <a:fontRef idx="minor">
+            <a:schemeClr val="lt1"/>
+          </a:fontRef>
+        </p:style>
+        <p:txBody>
+          <a:bodyPr rtlCol="0" anchor="ctr"/>
+          <a:lstStyle/>
+          <a:p>
+            <a:pPr algn="ctr"/>
+            <a:endParaRPr lang="en-US"/>
+          </a:p>
+        </p:txBody>
+      </p:sp>
+      <p:sp>
+        <p:nvSpPr>
+          <p:cNvPr id="20" name="Rectangle 19">
+            <a:extLst>
+              <a:ext uri="{FF2B5EF4-FFF2-40B4-BE49-F238E27FC236}">
+                <a16:creationId xmlns:a16="http://schemas.microsoft.com/office/drawing/2014/main" id="{8410CDDB-2B69-CE40-8F26-35E9E16C554D}"/>
+              </a:ext>
+            </a:extLst>
+          </p:cNvPr>
+          <p:cNvSpPr/>
+          <p:nvPr/>
+        </p:nvSpPr>
+        <p:spPr>
+          <a:xfrm>
+            <a:off x="8850730" y="3998716"/>
+            <a:ext cx="497861" cy="763820"/>
+          </a:xfrm>
+          <a:prstGeom prst="rect">
+            <a:avLst/>
+          </a:prstGeom>
+          <a:solidFill>
+            <a:srgbClr val="F6B759"/>
+          </a:solidFill>
+          <a:ln>
+            <a:noFill/>
+          </a:ln>
+        </p:spPr>
+        <p:style>
+          <a:lnRef idx="2">
+            <a:schemeClr val="accent1">
+              <a:shade val="50000"/>
+            </a:schemeClr>
+          </a:lnRef>
+          <a:fillRef idx="1">
+            <a:schemeClr val="accent1"/>
+          </a:fillRef>
+          <a:effectRef idx="0">
+            <a:schemeClr val="accent1"/>
+          </a:effectRef>
+          <a:fontRef idx="minor">
+            <a:schemeClr val="lt1"/>
+          </a:fontRef>
+        </p:style>
+        <p:txBody>
+          <a:bodyPr rtlCol="0" anchor="ctr"/>
+          <a:lstStyle/>
+          <a:p>
+            <a:pPr algn="ctr"/>
+            <a:endParaRPr lang="en-US"/>
+          </a:p>
+        </p:txBody>
+      </p:sp>
+      <p:sp>
+        <p:nvSpPr>
+          <p:cNvPr id="21" name="Rectangle 20">
+            <a:extLst>
+              <a:ext uri="{FF2B5EF4-FFF2-40B4-BE49-F238E27FC236}">
+                <a16:creationId xmlns:a16="http://schemas.microsoft.com/office/drawing/2014/main" id="{A8168F8B-852B-B64D-8ED5-ADC9A23176DC}"/>
+              </a:ext>
+            </a:extLst>
+          </p:cNvPr>
+          <p:cNvSpPr/>
+          <p:nvPr/>
+        </p:nvSpPr>
+        <p:spPr>
+          <a:xfrm>
+            <a:off x="10041125" y="3981257"/>
+            <a:ext cx="497861" cy="763820"/>
+          </a:xfrm>
+          <a:prstGeom prst="rect">
+            <a:avLst/>
+          </a:prstGeom>
+          <a:solidFill>
+            <a:srgbClr val="F6B759"/>
+          </a:solidFill>
+          <a:ln>
+            <a:noFill/>
+          </a:ln>
+        </p:spPr>
+        <p:style>
+          <a:lnRef idx="2">
+            <a:schemeClr val="accent1">
+              <a:shade val="50000"/>
+            </a:schemeClr>
+          </a:lnRef>
+          <a:fillRef idx="1">
+            <a:schemeClr val="accent1"/>
+          </a:fillRef>
+          <a:effectRef idx="0">
+            <a:schemeClr val="accent1"/>
+          </a:effectRef>
+          <a:fontRef idx="minor">
+            <a:schemeClr val="lt1"/>
+          </a:fontRef>
+        </p:style>
+        <p:txBody>
+          <a:bodyPr rtlCol="0" anchor="ctr"/>
+          <a:lstStyle/>
+          <a:p>
+            <a:pPr algn="ctr"/>
+            <a:endParaRPr lang="en-US"/>
+          </a:p>
+        </p:txBody>
+      </p:sp>
+      <p:pic>
+        <p:nvPicPr>
+          <p:cNvPr id="22" name="Graphic 21" descr="Fire">
+            <a:extLst>
+              <a:ext uri="{FF2B5EF4-FFF2-40B4-BE49-F238E27FC236}">
+                <a16:creationId xmlns:a16="http://schemas.microsoft.com/office/drawing/2014/main" id="{7A088E86-DF2F-6847-8BBA-704FC3875CA6}"/>
+              </a:ext>
+            </a:extLst>
+          </p:cNvPr>
+          <p:cNvPicPr>
+            <a:picLocks noChangeAspect="1"/>
+          </p:cNvPicPr>
+          <p:nvPr/>
+        </p:nvPicPr>
+        <p:blipFill>
+          <a:blip r:embed="rId2">
+            <a:extLst>
+              <a:ext uri="{96DAC541-7B7A-43D3-8B79-37D633B846F1}">
+                <asvg:svgBlip xmlns:asvg="http://schemas.microsoft.com/office/drawing/2016/SVG/main" r:embed="rId3"/>
+              </a:ext>
+            </a:extLst>
+          </a:blip>
+          <a:stretch>
+            <a:fillRect/>
+          </a:stretch>
+        </p:blipFill>
+        <p:spPr>
+          <a:xfrm>
+            <a:off x="9274463" y="2823078"/>
+            <a:ext cx="2392673" cy="2183871"/>
+          </a:xfrm>
+          <a:prstGeom prst="rect">
+            <a:avLst/>
+          </a:prstGeom>
+        </p:spPr>
+      </p:pic>
+      <p:pic>
+        <p:nvPicPr>
+          <p:cNvPr id="23" name="Graphic 22" descr="Fire">
+            <a:extLst>
+              <a:ext uri="{FF2B5EF4-FFF2-40B4-BE49-F238E27FC236}">
+                <a16:creationId xmlns:a16="http://schemas.microsoft.com/office/drawing/2014/main" id="{C43341FF-EE37-DD42-BEEA-C0E2258DF0E1}"/>
+              </a:ext>
+            </a:extLst>
+          </p:cNvPr>
+          <p:cNvPicPr>
+            <a:picLocks noChangeAspect="1"/>
+          </p:cNvPicPr>
+          <p:nvPr/>
+        </p:nvPicPr>
+        <p:blipFill>
+          <a:blip r:embed="rId2">
+            <a:extLst>
+              <a:ext uri="{96DAC541-7B7A-43D3-8B79-37D633B846F1}">
+                <asvg:svgBlip xmlns:asvg="http://schemas.microsoft.com/office/drawing/2016/SVG/main" r:embed="rId3"/>
+              </a:ext>
+            </a:extLst>
+          </a:blip>
+          <a:stretch>
+            <a:fillRect/>
+          </a:stretch>
+        </p:blipFill>
+        <p:spPr>
+          <a:xfrm>
+            <a:off x="8117580" y="2790494"/>
+            <a:ext cx="2392673" cy="2183871"/>
+          </a:xfrm>
+          <a:prstGeom prst="rect">
+            <a:avLst/>
+          </a:prstGeom>
+        </p:spPr>
+      </p:pic>
+      <p:pic>
+        <p:nvPicPr>
+          <p:cNvPr id="24" name="Graphic 23" descr="Fire">
+            <a:extLst>
+              <a:ext uri="{FF2B5EF4-FFF2-40B4-BE49-F238E27FC236}">
+                <a16:creationId xmlns:a16="http://schemas.microsoft.com/office/drawing/2014/main" id="{5ED32297-074E-384C-B9BB-8094A2B5EE3F}"/>
+              </a:ext>
+            </a:extLst>
+          </p:cNvPr>
+          <p:cNvPicPr>
+            <a:picLocks noChangeAspect="1"/>
+          </p:cNvPicPr>
+          <p:nvPr/>
+        </p:nvPicPr>
+        <p:blipFill>
+          <a:blip r:embed="rId2">
+            <a:extLst>
+              <a:ext uri="{96DAC541-7B7A-43D3-8B79-37D633B846F1}">
+                <asvg:svgBlip xmlns:asvg="http://schemas.microsoft.com/office/drawing/2016/SVG/main" r:embed="rId3"/>
+              </a:ext>
+            </a:extLst>
+          </a:blip>
+          <a:stretch>
+            <a:fillRect/>
+          </a:stretch>
+        </p:blipFill>
+        <p:spPr>
+          <a:xfrm>
+            <a:off x="7013742" y="2921513"/>
+            <a:ext cx="2392673" cy="2183871"/>
+          </a:xfrm>
+          <a:prstGeom prst="rect">
+            <a:avLst/>
+          </a:prstGeom>
+        </p:spPr>
+      </p:pic>
+      <p:pic>
+        <p:nvPicPr>
+          <p:cNvPr id="25" name="Graphic 24" descr="Deciduous tree">
+            <a:extLst>
+              <a:ext uri="{FF2B5EF4-FFF2-40B4-BE49-F238E27FC236}">
+                <a16:creationId xmlns:a16="http://schemas.microsoft.com/office/drawing/2014/main" id="{9B5140A7-BD95-BC4D-A3BE-43E8C7643D4F}"/>
+              </a:ext>
+            </a:extLst>
+          </p:cNvPr>
+          <p:cNvPicPr>
+            <a:picLocks noChangeAspect="1"/>
+          </p:cNvPicPr>
+          <p:nvPr/>
+        </p:nvPicPr>
+        <p:blipFill>
+          <a:blip r:embed="rId4">
+            <a:extLst>
+              <a:ext uri="{96DAC541-7B7A-43D3-8B79-37D633B846F1}">
+                <asvg:svgBlip xmlns:asvg="http://schemas.microsoft.com/office/drawing/2016/SVG/main" r:embed="rId5"/>
+              </a:ext>
+            </a:extLst>
+          </a:blip>
+          <a:stretch>
+            <a:fillRect/>
+          </a:stretch>
+        </p:blipFill>
+        <p:spPr>
+          <a:xfrm>
+            <a:off x="9150456" y="4252883"/>
+            <a:ext cx="1799885" cy="1799885"/>
+          </a:xfrm>
+          <a:prstGeom prst="rect">
+            <a:avLst/>
+          </a:prstGeom>
+        </p:spPr>
+      </p:pic>
+      <p:pic>
+        <p:nvPicPr>
+          <p:cNvPr id="26" name="Graphic 25" descr="Deciduous tree">
+            <a:extLst>
+              <a:ext uri="{FF2B5EF4-FFF2-40B4-BE49-F238E27FC236}">
+                <a16:creationId xmlns:a16="http://schemas.microsoft.com/office/drawing/2014/main" id="{9E33391B-3150-9A49-BF60-E33FF7C93A56}"/>
+              </a:ext>
+            </a:extLst>
+          </p:cNvPr>
+          <p:cNvPicPr>
+            <a:picLocks noChangeAspect="1"/>
+          </p:cNvPicPr>
+          <p:nvPr/>
+        </p:nvPicPr>
+        <p:blipFill>
+          <a:blip r:embed="rId4">
+            <a:extLst>
+              <a:ext uri="{96DAC541-7B7A-43D3-8B79-37D633B846F1}">
+                <asvg:svgBlip xmlns:asvg="http://schemas.microsoft.com/office/drawing/2016/SVG/main" r:embed="rId5"/>
+              </a:ext>
+            </a:extLst>
+          </a:blip>
+          <a:stretch>
+            <a:fillRect/>
+          </a:stretch>
+        </p:blipFill>
+        <p:spPr>
+          <a:xfrm>
+            <a:off x="7426130" y="4187333"/>
+            <a:ext cx="1799885" cy="1799885"/>
+          </a:xfrm>
+          <a:prstGeom prst="rect">
+            <a:avLst/>
+          </a:prstGeom>
+        </p:spPr>
+      </p:pic>
+      <p:pic>
+        <p:nvPicPr>
+          <p:cNvPr id="27" name="Graphic 26" descr="Deciduous tree">
+            <a:extLst>
+              <a:ext uri="{FF2B5EF4-FFF2-40B4-BE49-F238E27FC236}">
+                <a16:creationId xmlns:a16="http://schemas.microsoft.com/office/drawing/2014/main" id="{10A2F196-8B6C-044C-B11B-2C43B4A68DD3}"/>
+              </a:ext>
+            </a:extLst>
+          </p:cNvPr>
+          <p:cNvPicPr>
+            <a:picLocks noChangeAspect="1"/>
+          </p:cNvPicPr>
+          <p:nvPr/>
+        </p:nvPicPr>
+        <p:blipFill>
+          <a:blip r:embed="rId4">
+            <a:extLst>
+              <a:ext uri="{96DAC541-7B7A-43D3-8B79-37D633B846F1}">
+                <asvg:svgBlip xmlns:asvg="http://schemas.microsoft.com/office/drawing/2016/SVG/main" r:embed="rId5"/>
+              </a:ext>
+            </a:extLst>
+          </a:blip>
+          <a:stretch>
+            <a:fillRect/>
+          </a:stretch>
+        </p:blipFill>
+        <p:spPr>
+          <a:xfrm>
+            <a:off x="8250514" y="4407312"/>
+            <a:ext cx="1799885" cy="1799885"/>
+          </a:xfrm>
+          <a:prstGeom prst="rect">
+            <a:avLst/>
+          </a:prstGeom>
+        </p:spPr>
+      </p:pic>
       <p:grpSp>
         <p:nvGrpSpPr>
-          <p:cNvPr id="18" name="Group 17">
-            <a:extLst>
-              <a:ext uri="{FF2B5EF4-FFF2-40B4-BE49-F238E27FC236}">
-                <a16:creationId xmlns:a16="http://schemas.microsoft.com/office/drawing/2014/main" id="{68CFEF6E-AAF3-6F4B-B0D4-095E3E3461CD}"/>
+          <p:cNvPr id="40" name="Group 39">
+            <a:extLst>
+              <a:ext uri="{FF2B5EF4-FFF2-40B4-BE49-F238E27FC236}">
+                <a16:creationId xmlns:a16="http://schemas.microsoft.com/office/drawing/2014/main" id="{8FAF5A18-7363-0045-85D7-EDDF29759D04}"/>
               </a:ext>
             </a:extLst>
           </p:cNvPr>
@@ -7711,18 +8120,54 @@
         </p:nvGrpSpPr>
         <p:grpSpPr>
           <a:xfrm>
-            <a:off x="7013742" y="2790494"/>
-            <a:ext cx="4653394" cy="3416703"/>
-            <a:chOff x="6393939" y="770319"/>
-            <a:chExt cx="4653394" cy="3416703"/>
+            <a:off x="1802101" y="2711852"/>
+            <a:ext cx="1729994" cy="1409931"/>
+            <a:chOff x="1802100" y="2711852"/>
+            <a:chExt cx="2094039" cy="1695460"/>
           </a:xfrm>
         </p:grpSpPr>
+        <p:pic>
+          <p:nvPicPr>
+            <p:cNvPr id="4" name="Graphic 3" descr="Water">
+              <a:extLst>
+                <a:ext uri="{FF2B5EF4-FFF2-40B4-BE49-F238E27FC236}">
+                  <a16:creationId xmlns:a16="http://schemas.microsoft.com/office/drawing/2014/main" id="{2C30E774-54B3-C344-A427-88A560A8B43C}"/>
+                </a:ext>
+              </a:extLst>
+            </p:cNvPr>
+            <p:cNvPicPr>
+              <a:picLocks noChangeAspect="1"/>
+            </p:cNvPicPr>
+            <p:nvPr/>
+          </p:nvPicPr>
+          <p:blipFill>
+            <a:blip r:embed="rId6">
+              <a:extLst>
+                <a:ext uri="{96DAC541-7B7A-43D3-8B79-37D633B846F1}">
+                  <asvg:svgBlip xmlns:asvg="http://schemas.microsoft.com/office/drawing/2016/SVG/main" r:embed="rId7"/>
+                </a:ext>
+              </a:extLst>
+            </a:blip>
+            <a:stretch>
+              <a:fillRect/>
+            </a:stretch>
+          </p:blipFill>
+          <p:spPr>
+            <a:xfrm rot="19879614">
+              <a:off x="2338416" y="2711852"/>
+              <a:ext cx="914400" cy="914400"/>
+            </a:xfrm>
+            <a:prstGeom prst="rect">
+              <a:avLst/>
+            </a:prstGeom>
+          </p:spPr>
+        </p:pic>
         <p:sp>
           <p:nvSpPr>
-            <p:cNvPr id="19" name="Rectangle 18">
+            <p:cNvPr id="16" name="Rounded Rectangle 15">
               <a:extLst>
                 <a:ext uri="{FF2B5EF4-FFF2-40B4-BE49-F238E27FC236}">
-                  <a16:creationId xmlns:a16="http://schemas.microsoft.com/office/drawing/2014/main" id="{23100E99-CF6C-6340-8416-8B8D8668A095}"/>
+                  <a16:creationId xmlns:a16="http://schemas.microsoft.com/office/drawing/2014/main" id="{557F7A9B-5EF2-C24E-80CB-79F9C43AF01C}"/>
                 </a:ext>
               </a:extLst>
             </p:cNvPr>
@@ -7731,10 +8176,229 @@
           </p:nvSpPr>
           <p:spPr>
             <a:xfrm>
-              <a:off x="7057791" y="2101608"/>
-              <a:ext cx="497861" cy="763820"/>
+              <a:off x="2297981" y="3316396"/>
+              <a:ext cx="1118730" cy="408596"/>
             </a:xfrm>
-            <a:prstGeom prst="rect">
+            <a:prstGeom prst="roundRect">
+              <a:avLst>
+                <a:gd name="adj" fmla="val 50000"/>
+              </a:avLst>
+            </a:prstGeom>
+            <a:solidFill>
+              <a:srgbClr val="72492A"/>
+            </a:solidFill>
+            <a:ln>
+              <a:solidFill>
+                <a:schemeClr val="tx1"/>
+              </a:solidFill>
+            </a:ln>
+          </p:spPr>
+          <p:style>
+            <a:lnRef idx="2">
+              <a:schemeClr val="accent1">
+                <a:shade val="50000"/>
+              </a:schemeClr>
+            </a:lnRef>
+            <a:fillRef idx="1">
+              <a:schemeClr val="accent1"/>
+            </a:fillRef>
+            <a:effectRef idx="0">
+              <a:schemeClr val="accent1"/>
+            </a:effectRef>
+            <a:fontRef idx="minor">
+              <a:schemeClr val="lt1"/>
+            </a:fontRef>
+          </p:style>
+          <p:txBody>
+            <a:bodyPr rtlCol="0" anchor="ctr"/>
+            <a:lstStyle/>
+            <a:p>
+              <a:pPr algn="ctr"/>
+              <a:endParaRPr lang="en-US"/>
+            </a:p>
+          </p:txBody>
+        </p:sp>
+        <p:sp>
+          <p:nvSpPr>
+            <p:cNvPr id="13" name="Rounded Rectangle 12">
+              <a:extLst>
+                <a:ext uri="{FF2B5EF4-FFF2-40B4-BE49-F238E27FC236}">
+                  <a16:creationId xmlns:a16="http://schemas.microsoft.com/office/drawing/2014/main" id="{A69A80DB-ED7A-8349-A1D9-8F1A0E1A65B0}"/>
+                </a:ext>
+              </a:extLst>
+            </p:cNvPr>
+            <p:cNvSpPr/>
+            <p:nvPr/>
+          </p:nvSpPr>
+          <p:spPr>
+            <a:xfrm>
+              <a:off x="2055734" y="3670167"/>
+              <a:ext cx="1602987" cy="408596"/>
+            </a:xfrm>
+            <a:prstGeom prst="roundRect">
+              <a:avLst>
+                <a:gd name="adj" fmla="val 50000"/>
+              </a:avLst>
+            </a:prstGeom>
+            <a:solidFill>
+              <a:srgbClr val="72492A"/>
+            </a:solidFill>
+            <a:ln>
+              <a:solidFill>
+                <a:schemeClr val="tx1"/>
+              </a:solidFill>
+            </a:ln>
+          </p:spPr>
+          <p:style>
+            <a:lnRef idx="2">
+              <a:schemeClr val="accent1">
+                <a:shade val="50000"/>
+              </a:schemeClr>
+            </a:lnRef>
+            <a:fillRef idx="1">
+              <a:schemeClr val="accent1"/>
+            </a:fillRef>
+            <a:effectRef idx="0">
+              <a:schemeClr val="accent1"/>
+            </a:effectRef>
+            <a:fontRef idx="minor">
+              <a:schemeClr val="lt1"/>
+            </a:fontRef>
+          </p:style>
+          <p:txBody>
+            <a:bodyPr rtlCol="0" anchor="ctr"/>
+            <a:lstStyle/>
+            <a:p>
+              <a:pPr algn="ctr"/>
+              <a:endParaRPr lang="en-US"/>
+            </a:p>
+          </p:txBody>
+        </p:sp>
+        <p:sp>
+          <p:nvSpPr>
+            <p:cNvPr id="2" name="Rounded Rectangle 1">
+              <a:extLst>
+                <a:ext uri="{FF2B5EF4-FFF2-40B4-BE49-F238E27FC236}">
+                  <a16:creationId xmlns:a16="http://schemas.microsoft.com/office/drawing/2014/main" id="{B46FA368-7526-264F-A304-F8BE3A7880D8}"/>
+                </a:ext>
+              </a:extLst>
+            </p:cNvPr>
+            <p:cNvSpPr/>
+            <p:nvPr/>
+          </p:nvSpPr>
+          <p:spPr>
+            <a:xfrm>
+              <a:off x="1802100" y="3998716"/>
+              <a:ext cx="2094039" cy="408596"/>
+            </a:xfrm>
+            <a:prstGeom prst="roundRect">
+              <a:avLst>
+                <a:gd name="adj" fmla="val 50000"/>
+              </a:avLst>
+            </a:prstGeom>
+            <a:solidFill>
+              <a:srgbClr val="72492A"/>
+            </a:solidFill>
+            <a:ln>
+              <a:solidFill>
+                <a:schemeClr val="tx1"/>
+              </a:solidFill>
+            </a:ln>
+          </p:spPr>
+          <p:style>
+            <a:lnRef idx="2">
+              <a:schemeClr val="accent1">
+                <a:shade val="50000"/>
+              </a:schemeClr>
+            </a:lnRef>
+            <a:fillRef idx="1">
+              <a:schemeClr val="accent1"/>
+            </a:fillRef>
+            <a:effectRef idx="0">
+              <a:schemeClr val="accent1"/>
+            </a:effectRef>
+            <a:fontRef idx="minor">
+              <a:schemeClr val="lt1"/>
+            </a:fontRef>
+          </p:style>
+          <p:txBody>
+            <a:bodyPr rtlCol="0" anchor="ctr"/>
+            <a:lstStyle/>
+            <a:p>
+              <a:pPr algn="ctr"/>
+              <a:endParaRPr lang="en-US"/>
+            </a:p>
+          </p:txBody>
+        </p:sp>
+      </p:grpSp>
+    </p:spTree>
+    <p:extLst>
+      <p:ext uri="{BB962C8B-B14F-4D97-AF65-F5344CB8AC3E}">
+        <p14:creationId xmlns:p14="http://schemas.microsoft.com/office/powerpoint/2010/main" val="735009255"/>
+      </p:ext>
+    </p:extLst>
+  </p:cSld>
+  <p:clrMapOvr>
+    <a:masterClrMapping/>
+  </p:clrMapOvr>
+</p:sld>
+</file>
+
+<file path=ppt/slides/slide4.xml><?xml version="1.0" encoding="utf-8"?>
+<p:sld xmlns:a="http://schemas.openxmlformats.org/drawingml/2006/main" xmlns:r="http://schemas.openxmlformats.org/officeDocument/2006/relationships" xmlns:p="http://schemas.openxmlformats.org/presentationml/2006/main">
+  <p:cSld>
+    <p:spTree>
+      <p:nvGrpSpPr>
+        <p:cNvPr id="1" name=""/>
+        <p:cNvGrpSpPr/>
+        <p:nvPr/>
+      </p:nvGrpSpPr>
+      <p:grpSpPr>
+        <a:xfrm>
+          <a:off x="0" y="0"/>
+          <a:ext cx="0" cy="0"/>
+          <a:chOff x="0" y="0"/>
+          <a:chExt cx="0" cy="0"/>
+        </a:xfrm>
+      </p:grpSpPr>
+      <p:grpSp>
+        <p:nvGrpSpPr>
+          <p:cNvPr id="19" name="Group 18">
+            <a:extLst>
+              <a:ext uri="{FF2B5EF4-FFF2-40B4-BE49-F238E27FC236}">
+                <a16:creationId xmlns:a16="http://schemas.microsoft.com/office/drawing/2014/main" id="{8B22701D-674A-C04D-83ED-75833AF9C2C8}"/>
+              </a:ext>
+            </a:extLst>
+          </p:cNvPr>
+          <p:cNvGrpSpPr/>
+          <p:nvPr/>
+        </p:nvGrpSpPr>
+        <p:grpSpPr>
+          <a:xfrm>
+            <a:off x="4173509" y="2428717"/>
+            <a:ext cx="1552319" cy="1621782"/>
+            <a:chOff x="4173509" y="2428717"/>
+            <a:chExt cx="1552319" cy="1621782"/>
+          </a:xfrm>
+        </p:grpSpPr>
+        <p:sp>
+          <p:nvSpPr>
+            <p:cNvPr id="13" name="Oval 12">
+              <a:extLst>
+                <a:ext uri="{FF2B5EF4-FFF2-40B4-BE49-F238E27FC236}">
+                  <a16:creationId xmlns:a16="http://schemas.microsoft.com/office/drawing/2014/main" id="{BF4C121B-D2CF-E541-B4DB-9AAC619FFE57}"/>
+                </a:ext>
+              </a:extLst>
+            </p:cNvPr>
+            <p:cNvSpPr/>
+            <p:nvPr/>
+          </p:nvSpPr>
+          <p:spPr>
+            <a:xfrm>
+              <a:off x="4539574" y="3530632"/>
+              <a:ext cx="603926" cy="453840"/>
+            </a:xfrm>
+            <a:prstGeom prst="ellipse">
               <a:avLst/>
             </a:prstGeom>
             <a:solidFill>
@@ -7771,10 +8435,10 @@
         </p:sp>
         <p:sp>
           <p:nvSpPr>
-            <p:cNvPr id="20" name="Rectangle 19">
+            <p:cNvPr id="10" name="Rectangle 9">
               <a:extLst>
                 <a:ext uri="{FF2B5EF4-FFF2-40B4-BE49-F238E27FC236}">
-                  <a16:creationId xmlns:a16="http://schemas.microsoft.com/office/drawing/2014/main" id="{8410CDDB-2B69-CE40-8F26-35E9E16C554D}"/>
+                  <a16:creationId xmlns:a16="http://schemas.microsoft.com/office/drawing/2014/main" id="{550AD39F-F00F-8D47-9029-86379CF4F47E}"/>
                 </a:ext>
               </a:extLst>
             </p:cNvPr>
@@ -7783,8 +8447,8 @@
           </p:nvSpPr>
           <p:spPr>
             <a:xfrm>
-              <a:off x="8230927" y="1978541"/>
-              <a:ext cx="497861" cy="763820"/>
+              <a:off x="4539574" y="3374843"/>
+              <a:ext cx="421533" cy="438400"/>
             </a:xfrm>
             <a:prstGeom prst="rect">
               <a:avLst/>
@@ -7817,68 +8481,16 @@
             <a:lstStyle/>
             <a:p>
               <a:pPr algn="ctr"/>
-              <a:endParaRPr lang="en-US"/>
-            </a:p>
-          </p:txBody>
-        </p:sp>
-        <p:sp>
-          <p:nvSpPr>
-            <p:cNvPr id="21" name="Rectangle 20">
-              <a:extLst>
-                <a:ext uri="{FF2B5EF4-FFF2-40B4-BE49-F238E27FC236}">
-                  <a16:creationId xmlns:a16="http://schemas.microsoft.com/office/drawing/2014/main" id="{A8168F8B-852B-B64D-8ED5-ADC9A23176DC}"/>
-                </a:ext>
-              </a:extLst>
-            </p:cNvPr>
-            <p:cNvSpPr/>
-            <p:nvPr/>
-          </p:nvSpPr>
-          <p:spPr>
-            <a:xfrm>
-              <a:off x="9421322" y="1961082"/>
-              <a:ext cx="497861" cy="763820"/>
-            </a:xfrm>
-            <a:prstGeom prst="rect">
-              <a:avLst/>
-            </a:prstGeom>
-            <a:solidFill>
-              <a:srgbClr val="F6B759"/>
-            </a:solidFill>
-            <a:ln>
-              <a:noFill/>
-            </a:ln>
-          </p:spPr>
-          <p:style>
-            <a:lnRef idx="2">
-              <a:schemeClr val="accent1">
-                <a:shade val="50000"/>
-              </a:schemeClr>
-            </a:lnRef>
-            <a:fillRef idx="1">
-              <a:schemeClr val="accent1"/>
-            </a:fillRef>
-            <a:effectRef idx="0">
-              <a:schemeClr val="accent1"/>
-            </a:effectRef>
-            <a:fontRef idx="minor">
-              <a:schemeClr val="lt1"/>
-            </a:fontRef>
-          </p:style>
-          <p:txBody>
-            <a:bodyPr rtlCol="0" anchor="ctr"/>
-            <a:lstStyle/>
-            <a:p>
-              <a:pPr algn="ctr"/>
-              <a:endParaRPr lang="en-US"/>
+              <a:endParaRPr lang="en-US" dirty="0"/>
             </a:p>
           </p:txBody>
         </p:sp>
         <p:pic>
           <p:nvPicPr>
-            <p:cNvPr id="22" name="Graphic 21" descr="Fire">
+            <p:cNvPr id="11" name="Graphic 10" descr="Fire">
               <a:extLst>
                 <a:ext uri="{FF2B5EF4-FFF2-40B4-BE49-F238E27FC236}">
-                  <a16:creationId xmlns:a16="http://schemas.microsoft.com/office/drawing/2014/main" id="{7A088E86-DF2F-6847-8BBA-704FC3875CA6}"/>
+                  <a16:creationId xmlns:a16="http://schemas.microsoft.com/office/drawing/2014/main" id="{44067CD9-B543-FA48-95B7-12C286C8FA64}"/>
                 </a:ext>
               </a:extLst>
             </p:cNvPr>
@@ -7901,8 +8513,8 @@
           </p:blipFill>
           <p:spPr>
             <a:xfrm>
-              <a:off x="8654660" y="802903"/>
-              <a:ext cx="2392673" cy="2183871"/>
+              <a:off x="4173509" y="2674158"/>
+              <a:ext cx="1406685" cy="1376341"/>
             </a:xfrm>
             <a:prstGeom prst="rect">
               <a:avLst/>
@@ -7911,10 +8523,10 @@
         </p:pic>
         <p:pic>
           <p:nvPicPr>
-            <p:cNvPr id="23" name="Graphic 22" descr="Fire">
+            <p:cNvPr id="7" name="Picture 6" descr="A close up of a logo&#10;&#10;Description automatically generated">
               <a:extLst>
                 <a:ext uri="{FF2B5EF4-FFF2-40B4-BE49-F238E27FC236}">
-                  <a16:creationId xmlns:a16="http://schemas.microsoft.com/office/drawing/2014/main" id="{C43341FF-EE37-DD42-BEEA-C0E2258DF0E1}"/>
+                  <a16:creationId xmlns:a16="http://schemas.microsoft.com/office/drawing/2014/main" id="{CDC1096A-1905-0841-8915-351667403609}"/>
                 </a:ext>
               </a:extLst>
             </p:cNvPr>
@@ -7923,166 +8535,15 @@
             </p:cNvPicPr>
             <p:nvPr/>
           </p:nvPicPr>
-          <p:blipFill>
-            <a:blip r:embed="rId2">
-              <a:extLst>
-                <a:ext uri="{96DAC541-7B7A-43D3-8B79-37D633B846F1}">
-                  <asvg:svgBlip xmlns:asvg="http://schemas.microsoft.com/office/drawing/2016/SVG/main" r:embed="rId3"/>
-                </a:ext>
-              </a:extLst>
-            </a:blip>
-            <a:stretch>
-              <a:fillRect/>
-            </a:stretch>
+          <p:blipFill rotWithShape="1">
+            <a:blip r:embed="rId4"/>
+            <a:srcRect l="50867" r="-706"/>
+            <a:stretch/>
           </p:blipFill>
           <p:spPr>
             <a:xfrm>
-              <a:off x="7497777" y="770319"/>
-              <a:ext cx="2392673" cy="2183871"/>
-            </a:xfrm>
-            <a:prstGeom prst="rect">
-              <a:avLst/>
-            </a:prstGeom>
-          </p:spPr>
-        </p:pic>
-        <p:pic>
-          <p:nvPicPr>
-            <p:cNvPr id="24" name="Graphic 23" descr="Fire">
-              <a:extLst>
-                <a:ext uri="{FF2B5EF4-FFF2-40B4-BE49-F238E27FC236}">
-                  <a16:creationId xmlns:a16="http://schemas.microsoft.com/office/drawing/2014/main" id="{5ED32297-074E-384C-B9BB-8094A2B5EE3F}"/>
-                </a:ext>
-              </a:extLst>
-            </p:cNvPr>
-            <p:cNvPicPr>
-              <a:picLocks noChangeAspect="1"/>
-            </p:cNvPicPr>
-            <p:nvPr/>
-          </p:nvPicPr>
-          <p:blipFill>
-            <a:blip r:embed="rId2">
-              <a:extLst>
-                <a:ext uri="{96DAC541-7B7A-43D3-8B79-37D633B846F1}">
-                  <asvg:svgBlip xmlns:asvg="http://schemas.microsoft.com/office/drawing/2016/SVG/main" r:embed="rId3"/>
-                </a:ext>
-              </a:extLst>
-            </a:blip>
-            <a:stretch>
-              <a:fillRect/>
-            </a:stretch>
-          </p:blipFill>
-          <p:spPr>
-            <a:xfrm>
-              <a:off x="6393939" y="901338"/>
-              <a:ext cx="2392673" cy="2183871"/>
-            </a:xfrm>
-            <a:prstGeom prst="rect">
-              <a:avLst/>
-            </a:prstGeom>
-          </p:spPr>
-        </p:pic>
-        <p:pic>
-          <p:nvPicPr>
-            <p:cNvPr id="25" name="Graphic 24" descr="Deciduous tree">
-              <a:extLst>
-                <a:ext uri="{FF2B5EF4-FFF2-40B4-BE49-F238E27FC236}">
-                  <a16:creationId xmlns:a16="http://schemas.microsoft.com/office/drawing/2014/main" id="{9B5140A7-BD95-BC4D-A3BE-43E8C7643D4F}"/>
-                </a:ext>
-              </a:extLst>
-            </p:cNvPr>
-            <p:cNvPicPr>
-              <a:picLocks noChangeAspect="1"/>
-            </p:cNvPicPr>
-            <p:nvPr/>
-          </p:nvPicPr>
-          <p:blipFill>
-            <a:blip r:embed="rId4">
-              <a:extLst>
-                <a:ext uri="{96DAC541-7B7A-43D3-8B79-37D633B846F1}">
-                  <asvg:svgBlip xmlns:asvg="http://schemas.microsoft.com/office/drawing/2016/SVG/main" r:embed="rId5"/>
-                </a:ext>
-              </a:extLst>
-            </a:blip>
-            <a:stretch>
-              <a:fillRect/>
-            </a:stretch>
-          </p:blipFill>
-          <p:spPr>
-            <a:xfrm>
-              <a:off x="8530653" y="2232708"/>
-              <a:ext cx="1799885" cy="1799885"/>
-            </a:xfrm>
-            <a:prstGeom prst="rect">
-              <a:avLst/>
-            </a:prstGeom>
-          </p:spPr>
-        </p:pic>
-        <p:pic>
-          <p:nvPicPr>
-            <p:cNvPr id="26" name="Graphic 25" descr="Deciduous tree">
-              <a:extLst>
-                <a:ext uri="{FF2B5EF4-FFF2-40B4-BE49-F238E27FC236}">
-                  <a16:creationId xmlns:a16="http://schemas.microsoft.com/office/drawing/2014/main" id="{9E33391B-3150-9A49-BF60-E33FF7C93A56}"/>
-                </a:ext>
-              </a:extLst>
-            </p:cNvPr>
-            <p:cNvPicPr>
-              <a:picLocks noChangeAspect="1"/>
-            </p:cNvPicPr>
-            <p:nvPr/>
-          </p:nvPicPr>
-          <p:blipFill>
-            <a:blip r:embed="rId4">
-              <a:extLst>
-                <a:ext uri="{96DAC541-7B7A-43D3-8B79-37D633B846F1}">
-                  <asvg:svgBlip xmlns:asvg="http://schemas.microsoft.com/office/drawing/2016/SVG/main" r:embed="rId5"/>
-                </a:ext>
-              </a:extLst>
-            </a:blip>
-            <a:stretch>
-              <a:fillRect/>
-            </a:stretch>
-          </p:blipFill>
-          <p:spPr>
-            <a:xfrm>
-              <a:off x="6806327" y="2167158"/>
-              <a:ext cx="1799885" cy="1799885"/>
-            </a:xfrm>
-            <a:prstGeom prst="rect">
-              <a:avLst/>
-            </a:prstGeom>
-          </p:spPr>
-        </p:pic>
-        <p:pic>
-          <p:nvPicPr>
-            <p:cNvPr id="27" name="Graphic 26" descr="Deciduous tree">
-              <a:extLst>
-                <a:ext uri="{FF2B5EF4-FFF2-40B4-BE49-F238E27FC236}">
-                  <a16:creationId xmlns:a16="http://schemas.microsoft.com/office/drawing/2014/main" id="{10A2F196-8B6C-044C-B11B-2C43B4A68DD3}"/>
-                </a:ext>
-              </a:extLst>
-            </p:cNvPr>
-            <p:cNvPicPr>
-              <a:picLocks noChangeAspect="1"/>
-            </p:cNvPicPr>
-            <p:nvPr/>
-          </p:nvPicPr>
-          <p:blipFill>
-            <a:blip r:embed="rId4">
-              <a:extLst>
-                <a:ext uri="{96DAC541-7B7A-43D3-8B79-37D633B846F1}">
-                  <asvg:svgBlip xmlns:asvg="http://schemas.microsoft.com/office/drawing/2016/SVG/main" r:embed="rId5"/>
-                </a:ext>
-              </a:extLst>
-            </a:blip>
-            <a:stretch>
-              <a:fillRect/>
-            </a:stretch>
-          </p:blipFill>
-          <p:spPr>
-            <a:xfrm>
-              <a:off x="7630711" y="2387137"/>
-              <a:ext cx="1799885" cy="1799885"/>
+              <a:off x="4899939" y="2428717"/>
+              <a:ext cx="825889" cy="1555755"/>
             </a:xfrm>
             <a:prstGeom prst="rect">
               <a:avLst/>
@@ -8090,10 +8551,56 @@
           </p:spPr>
         </p:pic>
       </p:grpSp>
+      <p:sp>
+        <p:nvSpPr>
+          <p:cNvPr id="12" name="Rectangle 11">
+            <a:extLst>
+              <a:ext uri="{FF2B5EF4-FFF2-40B4-BE49-F238E27FC236}">
+                <a16:creationId xmlns:a16="http://schemas.microsoft.com/office/drawing/2014/main" id="{E5AF0469-699E-7B42-8AEE-FEC930DCB4DA}"/>
+              </a:ext>
+            </a:extLst>
+          </p:cNvPr>
+          <p:cNvSpPr/>
+          <p:nvPr/>
+        </p:nvSpPr>
+        <p:spPr>
+          <a:xfrm>
+            <a:off x="4200525" y="4993481"/>
+            <a:ext cx="424267" cy="221456"/>
+          </a:xfrm>
+          <a:prstGeom prst="rect">
+            <a:avLst/>
+          </a:prstGeom>
+        </p:spPr>
+        <p:style>
+          <a:lnRef idx="2">
+            <a:schemeClr val="accent1">
+              <a:shade val="50000"/>
+            </a:schemeClr>
+          </a:lnRef>
+          <a:fillRef idx="1">
+            <a:schemeClr val="accent1"/>
+          </a:fillRef>
+          <a:effectRef idx="0">
+            <a:schemeClr val="accent1"/>
+          </a:effectRef>
+          <a:fontRef idx="minor">
+            <a:schemeClr val="lt1"/>
+          </a:fontRef>
+        </p:style>
+        <p:txBody>
+          <a:bodyPr rtlCol="0" anchor="ctr"/>
+          <a:lstStyle/>
+          <a:p>
+            <a:pPr algn="ctr"/>
+            <a:endParaRPr lang="en-US"/>
+          </a:p>
+        </p:txBody>
+      </p:sp>
     </p:spTree>
     <p:extLst>
       <p:ext uri="{BB962C8B-B14F-4D97-AF65-F5344CB8AC3E}">
-        <p14:creationId xmlns:p14="http://schemas.microsoft.com/office/powerpoint/2010/main" val="735009255"/>
+        <p14:creationId xmlns:p14="http://schemas.microsoft.com/office/powerpoint/2010/main" val="3223764792"/>
       </p:ext>
     </p:extLst>
   </p:cSld>

</xml_diff>

<commit_message>
made some UI changes to the graph
</commit_message>
<xml_diff>
--- a/litorshiticons.pptx
+++ b/litorshiticons.pptx
@@ -4,6 +4,9 @@
   <p:sldMasterIdLst>
     <p:sldMasterId id="2147483648" r:id="rId1"/>
   </p:sldMasterIdLst>
+  <p:notesMasterIdLst>
+    <p:notesMasterId r:id="rId6"/>
+  </p:notesMasterIdLst>
   <p:sldIdLst>
     <p:sldId id="256" r:id="rId2"/>
     <p:sldId id="257" r:id="rId3"/>
@@ -115,6 +118,445 @@
 </p:presentation>
 </file>
 
+<file path=ppt/notesMasters/notesMaster1.xml><?xml version="1.0" encoding="utf-8"?>
+<p:notesMaster xmlns:a="http://schemas.openxmlformats.org/drawingml/2006/main" xmlns:r="http://schemas.openxmlformats.org/officeDocument/2006/relationships" xmlns:p="http://schemas.openxmlformats.org/presentationml/2006/main">
+  <p:cSld>
+    <p:bg>
+      <p:bgRef idx="1001">
+        <a:schemeClr val="bg1"/>
+      </p:bgRef>
+    </p:bg>
+    <p:spTree>
+      <p:nvGrpSpPr>
+        <p:cNvPr id="1" name=""/>
+        <p:cNvGrpSpPr/>
+        <p:nvPr/>
+      </p:nvGrpSpPr>
+      <p:grpSpPr>
+        <a:xfrm>
+          <a:off x="0" y="0"/>
+          <a:ext cx="0" cy="0"/>
+          <a:chOff x="0" y="0"/>
+          <a:chExt cx="0" cy="0"/>
+        </a:xfrm>
+      </p:grpSpPr>
+      <p:sp>
+        <p:nvSpPr>
+          <p:cNvPr id="2" name="Header Placeholder 1"/>
+          <p:cNvSpPr>
+            <a:spLocks noGrp="1"/>
+          </p:cNvSpPr>
+          <p:nvPr>
+            <p:ph type="hdr" sz="quarter"/>
+          </p:nvPr>
+        </p:nvSpPr>
+        <p:spPr>
+          <a:xfrm>
+            <a:off x="0" y="0"/>
+            <a:ext cx="2971800" cy="458788"/>
+          </a:xfrm>
+          <a:prstGeom prst="rect">
+            <a:avLst/>
+          </a:prstGeom>
+        </p:spPr>
+        <p:txBody>
+          <a:bodyPr vert="horz" lIns="91440" tIns="45720" rIns="91440" bIns="45720" rtlCol="0"/>
+          <a:lstStyle>
+            <a:lvl1pPr algn="l">
+              <a:defRPr sz="1200"/>
+            </a:lvl1pPr>
+          </a:lstStyle>
+          <a:p>
+            <a:endParaRPr lang="en-US"/>
+          </a:p>
+        </p:txBody>
+      </p:sp>
+      <p:sp>
+        <p:nvSpPr>
+          <p:cNvPr id="3" name="Date Placeholder 2"/>
+          <p:cNvSpPr>
+            <a:spLocks noGrp="1"/>
+          </p:cNvSpPr>
+          <p:nvPr>
+            <p:ph type="dt" idx="1"/>
+          </p:nvPr>
+        </p:nvSpPr>
+        <p:spPr>
+          <a:xfrm>
+            <a:off x="3884613" y="0"/>
+            <a:ext cx="2971800" cy="458788"/>
+          </a:xfrm>
+          <a:prstGeom prst="rect">
+            <a:avLst/>
+          </a:prstGeom>
+        </p:spPr>
+        <p:txBody>
+          <a:bodyPr vert="horz" lIns="91440" tIns="45720" rIns="91440" bIns="45720" rtlCol="0"/>
+          <a:lstStyle>
+            <a:lvl1pPr algn="r">
+              <a:defRPr sz="1200"/>
+            </a:lvl1pPr>
+          </a:lstStyle>
+          <a:p>
+            <a:fld id="{577105BF-6CC1-0546-A937-AEB00F9CAA8E}" type="datetimeFigureOut">
+              <a:rPr lang="en-US" smtClean="0"/>
+              <a:t>6/9/19</a:t>
+            </a:fld>
+            <a:endParaRPr lang="en-US"/>
+          </a:p>
+        </p:txBody>
+      </p:sp>
+      <p:sp>
+        <p:nvSpPr>
+          <p:cNvPr id="4" name="Slide Image Placeholder 3"/>
+          <p:cNvSpPr>
+            <a:spLocks noGrp="1" noRot="1" noChangeAspect="1"/>
+          </p:cNvSpPr>
+          <p:nvPr>
+            <p:ph type="sldImg" idx="2"/>
+          </p:nvPr>
+        </p:nvSpPr>
+        <p:spPr>
+          <a:xfrm>
+            <a:off x="685800" y="1143000"/>
+            <a:ext cx="5486400" cy="3086100"/>
+          </a:xfrm>
+          <a:prstGeom prst="rect">
+            <a:avLst/>
+          </a:prstGeom>
+          <a:noFill/>
+          <a:ln w="12700">
+            <a:solidFill>
+              <a:prstClr val="black"/>
+            </a:solidFill>
+          </a:ln>
+        </p:spPr>
+        <p:txBody>
+          <a:bodyPr vert="horz" lIns="91440" tIns="45720" rIns="91440" bIns="45720" rtlCol="0" anchor="ctr"/>
+          <a:lstStyle/>
+          <a:p>
+            <a:endParaRPr lang="en-US"/>
+          </a:p>
+        </p:txBody>
+      </p:sp>
+      <p:sp>
+        <p:nvSpPr>
+          <p:cNvPr id="5" name="Notes Placeholder 4"/>
+          <p:cNvSpPr>
+            <a:spLocks noGrp="1"/>
+          </p:cNvSpPr>
+          <p:nvPr>
+            <p:ph type="body" sz="quarter" idx="3"/>
+          </p:nvPr>
+        </p:nvSpPr>
+        <p:spPr>
+          <a:xfrm>
+            <a:off x="685800" y="4400550"/>
+            <a:ext cx="5486400" cy="3600450"/>
+          </a:xfrm>
+          <a:prstGeom prst="rect">
+            <a:avLst/>
+          </a:prstGeom>
+        </p:spPr>
+        <p:txBody>
+          <a:bodyPr vert="horz" lIns="91440" tIns="45720" rIns="91440" bIns="45720" rtlCol="0"/>
+          <a:lstStyle/>
+          <a:p>
+            <a:pPr lvl="0"/>
+            <a:r>
+              <a:rPr lang="en-US"/>
+              <a:t>Click to edit Master text styles</a:t>
+            </a:r>
+          </a:p>
+          <a:p>
+            <a:pPr lvl="1"/>
+            <a:r>
+              <a:rPr lang="en-US"/>
+              <a:t>Second level</a:t>
+            </a:r>
+          </a:p>
+          <a:p>
+            <a:pPr lvl="2"/>
+            <a:r>
+              <a:rPr lang="en-US"/>
+              <a:t>Third level</a:t>
+            </a:r>
+          </a:p>
+          <a:p>
+            <a:pPr lvl="3"/>
+            <a:r>
+              <a:rPr lang="en-US"/>
+              <a:t>Fourth level</a:t>
+            </a:r>
+          </a:p>
+          <a:p>
+            <a:pPr lvl="4"/>
+            <a:r>
+              <a:rPr lang="en-US"/>
+              <a:t>Fifth level</a:t>
+            </a:r>
+          </a:p>
+        </p:txBody>
+      </p:sp>
+      <p:sp>
+        <p:nvSpPr>
+          <p:cNvPr id="6" name="Footer Placeholder 5"/>
+          <p:cNvSpPr>
+            <a:spLocks noGrp="1"/>
+          </p:cNvSpPr>
+          <p:nvPr>
+            <p:ph type="ftr" sz="quarter" idx="4"/>
+          </p:nvPr>
+        </p:nvSpPr>
+        <p:spPr>
+          <a:xfrm>
+            <a:off x="0" y="8685213"/>
+            <a:ext cx="2971800" cy="458787"/>
+          </a:xfrm>
+          <a:prstGeom prst="rect">
+            <a:avLst/>
+          </a:prstGeom>
+        </p:spPr>
+        <p:txBody>
+          <a:bodyPr vert="horz" lIns="91440" tIns="45720" rIns="91440" bIns="45720" rtlCol="0" anchor="b"/>
+          <a:lstStyle>
+            <a:lvl1pPr algn="l">
+              <a:defRPr sz="1200"/>
+            </a:lvl1pPr>
+          </a:lstStyle>
+          <a:p>
+            <a:endParaRPr lang="en-US"/>
+          </a:p>
+        </p:txBody>
+      </p:sp>
+      <p:sp>
+        <p:nvSpPr>
+          <p:cNvPr id="7" name="Slide Number Placeholder 6"/>
+          <p:cNvSpPr>
+            <a:spLocks noGrp="1"/>
+          </p:cNvSpPr>
+          <p:nvPr>
+            <p:ph type="sldNum" sz="quarter" idx="5"/>
+          </p:nvPr>
+        </p:nvSpPr>
+        <p:spPr>
+          <a:xfrm>
+            <a:off x="3884613" y="8685213"/>
+            <a:ext cx="2971800" cy="458787"/>
+          </a:xfrm>
+          <a:prstGeom prst="rect">
+            <a:avLst/>
+          </a:prstGeom>
+        </p:spPr>
+        <p:txBody>
+          <a:bodyPr vert="horz" lIns="91440" tIns="45720" rIns="91440" bIns="45720" rtlCol="0" anchor="b"/>
+          <a:lstStyle>
+            <a:lvl1pPr algn="r">
+              <a:defRPr sz="1200"/>
+            </a:lvl1pPr>
+          </a:lstStyle>
+          <a:p>
+            <a:fld id="{43FE9919-D4EA-ED4B-8BCF-864A062D236D}" type="slidenum">
+              <a:rPr lang="en-US" smtClean="0"/>
+              <a:t>‹#›</a:t>
+            </a:fld>
+            <a:endParaRPr lang="en-US"/>
+          </a:p>
+        </p:txBody>
+      </p:sp>
+    </p:spTree>
+    <p:extLst>
+      <p:ext uri="{BB962C8B-B14F-4D97-AF65-F5344CB8AC3E}">
+        <p14:creationId xmlns:p14="http://schemas.microsoft.com/office/powerpoint/2010/main" val="1517134022"/>
+      </p:ext>
+    </p:extLst>
+  </p:cSld>
+  <p:clrMap bg1="lt1" tx1="dk1" bg2="lt2" tx2="dk2" accent1="accent1" accent2="accent2" accent3="accent3" accent4="accent4" accent5="accent5" accent6="accent6" hlink="hlink" folHlink="folHlink"/>
+  <p:notesStyle>
+    <a:lvl1pPr marL="0" algn="l" defTabSz="914400" rtl="0" eaLnBrk="1" latinLnBrk="0" hangingPunct="1">
+      <a:defRPr sz="1200" kern="1200">
+        <a:solidFill>
+          <a:schemeClr val="tx1"/>
+        </a:solidFill>
+        <a:latin typeface="+mn-lt"/>
+        <a:ea typeface="+mn-ea"/>
+        <a:cs typeface="+mn-cs"/>
+      </a:defRPr>
+    </a:lvl1pPr>
+    <a:lvl2pPr marL="457200" algn="l" defTabSz="914400" rtl="0" eaLnBrk="1" latinLnBrk="0" hangingPunct="1">
+      <a:defRPr sz="1200" kern="1200">
+        <a:solidFill>
+          <a:schemeClr val="tx1"/>
+        </a:solidFill>
+        <a:latin typeface="+mn-lt"/>
+        <a:ea typeface="+mn-ea"/>
+        <a:cs typeface="+mn-cs"/>
+      </a:defRPr>
+    </a:lvl2pPr>
+    <a:lvl3pPr marL="914400" algn="l" defTabSz="914400" rtl="0" eaLnBrk="1" latinLnBrk="0" hangingPunct="1">
+      <a:defRPr sz="1200" kern="1200">
+        <a:solidFill>
+          <a:schemeClr val="tx1"/>
+        </a:solidFill>
+        <a:latin typeface="+mn-lt"/>
+        <a:ea typeface="+mn-ea"/>
+        <a:cs typeface="+mn-cs"/>
+      </a:defRPr>
+    </a:lvl3pPr>
+    <a:lvl4pPr marL="1371600" algn="l" defTabSz="914400" rtl="0" eaLnBrk="1" latinLnBrk="0" hangingPunct="1">
+      <a:defRPr sz="1200" kern="1200">
+        <a:solidFill>
+          <a:schemeClr val="tx1"/>
+        </a:solidFill>
+        <a:latin typeface="+mn-lt"/>
+        <a:ea typeface="+mn-ea"/>
+        <a:cs typeface="+mn-cs"/>
+      </a:defRPr>
+    </a:lvl4pPr>
+    <a:lvl5pPr marL="1828800" algn="l" defTabSz="914400" rtl="0" eaLnBrk="1" latinLnBrk="0" hangingPunct="1">
+      <a:defRPr sz="1200" kern="1200">
+        <a:solidFill>
+          <a:schemeClr val="tx1"/>
+        </a:solidFill>
+        <a:latin typeface="+mn-lt"/>
+        <a:ea typeface="+mn-ea"/>
+        <a:cs typeface="+mn-cs"/>
+      </a:defRPr>
+    </a:lvl5pPr>
+    <a:lvl6pPr marL="2286000" algn="l" defTabSz="914400" rtl="0" eaLnBrk="1" latinLnBrk="0" hangingPunct="1">
+      <a:defRPr sz="1200" kern="1200">
+        <a:solidFill>
+          <a:schemeClr val="tx1"/>
+        </a:solidFill>
+        <a:latin typeface="+mn-lt"/>
+        <a:ea typeface="+mn-ea"/>
+        <a:cs typeface="+mn-cs"/>
+      </a:defRPr>
+    </a:lvl6pPr>
+    <a:lvl7pPr marL="2743200" algn="l" defTabSz="914400" rtl="0" eaLnBrk="1" latinLnBrk="0" hangingPunct="1">
+      <a:defRPr sz="1200" kern="1200">
+        <a:solidFill>
+          <a:schemeClr val="tx1"/>
+        </a:solidFill>
+        <a:latin typeface="+mn-lt"/>
+        <a:ea typeface="+mn-ea"/>
+        <a:cs typeface="+mn-cs"/>
+      </a:defRPr>
+    </a:lvl7pPr>
+    <a:lvl8pPr marL="3200400" algn="l" defTabSz="914400" rtl="0" eaLnBrk="1" latinLnBrk="0" hangingPunct="1">
+      <a:defRPr sz="1200" kern="1200">
+        <a:solidFill>
+          <a:schemeClr val="tx1"/>
+        </a:solidFill>
+        <a:latin typeface="+mn-lt"/>
+        <a:ea typeface="+mn-ea"/>
+        <a:cs typeface="+mn-cs"/>
+      </a:defRPr>
+    </a:lvl8pPr>
+    <a:lvl9pPr marL="3657600" algn="l" defTabSz="914400" rtl="0" eaLnBrk="1" latinLnBrk="0" hangingPunct="1">
+      <a:defRPr sz="1200" kern="1200">
+        <a:solidFill>
+          <a:schemeClr val="tx1"/>
+        </a:solidFill>
+        <a:latin typeface="+mn-lt"/>
+        <a:ea typeface="+mn-ea"/>
+        <a:cs typeface="+mn-cs"/>
+      </a:defRPr>
+    </a:lvl9pPr>
+  </p:notesStyle>
+</p:notesMaster>
+</file>
+
+<file path=ppt/notesSlides/notesSlide1.xml><?xml version="1.0" encoding="utf-8"?>
+<p:notes xmlns:a="http://schemas.openxmlformats.org/drawingml/2006/main" xmlns:r="http://schemas.openxmlformats.org/officeDocument/2006/relationships" xmlns:p="http://schemas.openxmlformats.org/presentationml/2006/main">
+  <p:cSld>
+    <p:spTree>
+      <p:nvGrpSpPr>
+        <p:cNvPr id="1" name=""/>
+        <p:cNvGrpSpPr/>
+        <p:nvPr/>
+      </p:nvGrpSpPr>
+      <p:grpSpPr>
+        <a:xfrm>
+          <a:off x="0" y="0"/>
+          <a:ext cx="0" cy="0"/>
+          <a:chOff x="0" y="0"/>
+          <a:chExt cx="0" cy="0"/>
+        </a:xfrm>
+      </p:grpSpPr>
+      <p:sp>
+        <p:nvSpPr>
+          <p:cNvPr id="2" name="Slide Image Placeholder 1"/>
+          <p:cNvSpPr>
+            <a:spLocks noGrp="1" noRot="1" noChangeAspect="1"/>
+          </p:cNvSpPr>
+          <p:nvPr>
+            <p:ph type="sldImg"/>
+          </p:nvPr>
+        </p:nvSpPr>
+        <p:spPr/>
+      </p:sp>
+      <p:sp>
+        <p:nvSpPr>
+          <p:cNvPr id="3" name="Notes Placeholder 2"/>
+          <p:cNvSpPr>
+            <a:spLocks noGrp="1"/>
+          </p:cNvSpPr>
+          <p:nvPr>
+            <p:ph type="body" idx="1"/>
+          </p:nvPr>
+        </p:nvSpPr>
+        <p:spPr/>
+        <p:txBody>
+          <a:bodyPr/>
+          <a:lstStyle/>
+          <a:p>
+            <a:r>
+              <a:rPr lang="en-US" dirty="0"/>
+              <a:t>Either they vote or they stay 20 minutes</a:t>
+            </a:r>
+          </a:p>
+          <a:p>
+            <a:endParaRPr lang="en-US" dirty="0"/>
+          </a:p>
+        </p:txBody>
+      </p:sp>
+      <p:sp>
+        <p:nvSpPr>
+          <p:cNvPr id="4" name="Slide Number Placeholder 3"/>
+          <p:cNvSpPr>
+            <a:spLocks noGrp="1"/>
+          </p:cNvSpPr>
+          <p:nvPr>
+            <p:ph type="sldNum" sz="quarter" idx="5"/>
+          </p:nvPr>
+        </p:nvSpPr>
+        <p:spPr/>
+        <p:txBody>
+          <a:bodyPr/>
+          <a:lstStyle/>
+          <a:p>
+            <a:fld id="{43FE9919-D4EA-ED4B-8BCF-864A062D236D}" type="slidenum">
+              <a:rPr lang="en-US" smtClean="0"/>
+              <a:t>4</a:t>
+            </a:fld>
+            <a:endParaRPr lang="en-US"/>
+          </a:p>
+        </p:txBody>
+      </p:sp>
+    </p:spTree>
+    <p:extLst>
+      <p:ext uri="{BB962C8B-B14F-4D97-AF65-F5344CB8AC3E}">
+        <p14:creationId xmlns:p14="http://schemas.microsoft.com/office/powerpoint/2010/main" val="2305928410"/>
+      </p:ext>
+    </p:extLst>
+  </p:cSld>
+  <p:clrMapOvr>
+    <a:masterClrMapping/>
+  </p:clrMapOvr>
+</p:notes>
+</file>
+
 <file path=ppt/slideLayouts/slideLayout1.xml><?xml version="1.0" encoding="utf-8"?>
 <p:sldLayout xmlns:a="http://schemas.openxmlformats.org/drawingml/2006/main" xmlns:r="http://schemas.openxmlformats.org/officeDocument/2006/relationships" xmlns:p="http://schemas.openxmlformats.org/presentationml/2006/main" type="title" preserve="1">
   <p:cSld name="Title Slide">
@@ -262,7 +704,7 @@
           <a:p>
             <a:fld id="{6FE6319C-EC6B-2F49-A488-C10CCF64866F}" type="datetimeFigureOut">
               <a:rPr lang="en-US" smtClean="0"/>
-              <a:t>5/11/19</a:t>
+              <a:t>6/9/19</a:t>
             </a:fld>
             <a:endParaRPr lang="en-US"/>
           </a:p>
@@ -460,7 +902,7 @@
           <a:p>
             <a:fld id="{6FE6319C-EC6B-2F49-A488-C10CCF64866F}" type="datetimeFigureOut">
               <a:rPr lang="en-US" smtClean="0"/>
-              <a:t>5/11/19</a:t>
+              <a:t>6/9/19</a:t>
             </a:fld>
             <a:endParaRPr lang="en-US"/>
           </a:p>
@@ -668,7 +1110,7 @@
           <a:p>
             <a:fld id="{6FE6319C-EC6B-2F49-A488-C10CCF64866F}" type="datetimeFigureOut">
               <a:rPr lang="en-US" smtClean="0"/>
-              <a:t>5/11/19</a:t>
+              <a:t>6/9/19</a:t>
             </a:fld>
             <a:endParaRPr lang="en-US"/>
           </a:p>
@@ -866,7 +1308,7 @@
           <a:p>
             <a:fld id="{6FE6319C-EC6B-2F49-A488-C10CCF64866F}" type="datetimeFigureOut">
               <a:rPr lang="en-US" smtClean="0"/>
-              <a:t>5/11/19</a:t>
+              <a:t>6/9/19</a:t>
             </a:fld>
             <a:endParaRPr lang="en-US"/>
           </a:p>
@@ -1141,7 +1583,7 @@
           <a:p>
             <a:fld id="{6FE6319C-EC6B-2F49-A488-C10CCF64866F}" type="datetimeFigureOut">
               <a:rPr lang="en-US" smtClean="0"/>
-              <a:t>5/11/19</a:t>
+              <a:t>6/9/19</a:t>
             </a:fld>
             <a:endParaRPr lang="en-US"/>
           </a:p>
@@ -1406,7 +1848,7 @@
           <a:p>
             <a:fld id="{6FE6319C-EC6B-2F49-A488-C10CCF64866F}" type="datetimeFigureOut">
               <a:rPr lang="en-US" smtClean="0"/>
-              <a:t>5/11/19</a:t>
+              <a:t>6/9/19</a:t>
             </a:fld>
             <a:endParaRPr lang="en-US"/>
           </a:p>
@@ -1818,7 +2260,7 @@
           <a:p>
             <a:fld id="{6FE6319C-EC6B-2F49-A488-C10CCF64866F}" type="datetimeFigureOut">
               <a:rPr lang="en-US" smtClean="0"/>
-              <a:t>5/11/19</a:t>
+              <a:t>6/9/19</a:t>
             </a:fld>
             <a:endParaRPr lang="en-US"/>
           </a:p>
@@ -1959,7 +2401,7 @@
           <a:p>
             <a:fld id="{6FE6319C-EC6B-2F49-A488-C10CCF64866F}" type="datetimeFigureOut">
               <a:rPr lang="en-US" smtClean="0"/>
-              <a:t>5/11/19</a:t>
+              <a:t>6/9/19</a:t>
             </a:fld>
             <a:endParaRPr lang="en-US"/>
           </a:p>
@@ -2072,7 +2514,7 @@
           <a:p>
             <a:fld id="{6FE6319C-EC6B-2F49-A488-C10CCF64866F}" type="datetimeFigureOut">
               <a:rPr lang="en-US" smtClean="0"/>
-              <a:t>5/11/19</a:t>
+              <a:t>6/9/19</a:t>
             </a:fld>
             <a:endParaRPr lang="en-US"/>
           </a:p>
@@ -2383,7 +2825,7 @@
           <a:p>
             <a:fld id="{6FE6319C-EC6B-2F49-A488-C10CCF64866F}" type="datetimeFigureOut">
               <a:rPr lang="en-US" smtClean="0"/>
-              <a:t>5/11/19</a:t>
+              <a:t>6/9/19</a:t>
             </a:fld>
             <a:endParaRPr lang="en-US"/>
           </a:p>
@@ -2671,7 +3113,7 @@
           <a:p>
             <a:fld id="{6FE6319C-EC6B-2F49-A488-C10CCF64866F}" type="datetimeFigureOut">
               <a:rPr lang="en-US" smtClean="0"/>
-              <a:t>5/11/19</a:t>
+              <a:t>6/9/19</a:t>
             </a:fld>
             <a:endParaRPr lang="en-US"/>
           </a:p>
@@ -2912,7 +3354,7 @@
           <a:p>
             <a:fld id="{6FE6319C-EC6B-2F49-A488-C10CCF64866F}" type="datetimeFigureOut">
               <a:rPr lang="en-US" smtClean="0"/>
-              <a:t>5/11/19</a:t>
+              <a:t>6/9/19</a:t>
             </a:fld>
             <a:endParaRPr lang="en-US"/>
           </a:p>
@@ -4886,7 +5328,7 @@
         </p:nvSpPr>
         <p:spPr>
           <a:xfrm>
-            <a:off x="8509475" y="258172"/>
+            <a:off x="7549719" y="1038604"/>
             <a:ext cx="1060670" cy="763820"/>
           </a:xfrm>
           <a:prstGeom prst="rect">
@@ -5722,10 +6164,10 @@
         </p:nvGrpSpPr>
         <p:grpSpPr>
           <a:xfrm>
-            <a:off x="1356749" y="3106545"/>
-            <a:ext cx="2468880" cy="2701139"/>
-            <a:chOff x="7443625" y="538448"/>
-            <a:chExt cx="2468880" cy="2701139"/>
+            <a:off x="746095" y="1681180"/>
+            <a:ext cx="3665218" cy="4294751"/>
+            <a:chOff x="7003798" y="-1055164"/>
+            <a:chExt cx="3665218" cy="4294751"/>
           </a:xfrm>
         </p:grpSpPr>
         <p:sp>
@@ -5742,7 +6184,7 @@
           </p:nvSpPr>
           <p:spPr>
             <a:xfrm>
-              <a:off x="8265985" y="1620456"/>
+              <a:off x="9512546" y="382487"/>
               <a:ext cx="657430" cy="810279"/>
             </a:xfrm>
             <a:prstGeom prst="rect">
@@ -5780,42 +6222,6 @@
             </a:p>
           </p:txBody>
         </p:sp>
-        <p:pic>
-          <p:nvPicPr>
-            <p:cNvPr id="66" name="Graphic 65" descr="Fire">
-              <a:extLst>
-                <a:ext uri="{FF2B5EF4-FFF2-40B4-BE49-F238E27FC236}">
-                  <a16:creationId xmlns:a16="http://schemas.microsoft.com/office/drawing/2014/main" id="{C5223906-7770-914A-81D0-2B07D056ABB3}"/>
-                </a:ext>
-              </a:extLst>
-            </p:cNvPr>
-            <p:cNvPicPr>
-              <a:picLocks noChangeAspect="1"/>
-            </p:cNvPicPr>
-            <p:nvPr/>
-          </p:nvPicPr>
-          <p:blipFill>
-            <a:blip r:embed="rId4">
-              <a:extLst>
-                <a:ext uri="{96DAC541-7B7A-43D3-8B79-37D633B846F1}">
-                  <asvg:svgBlip xmlns:asvg="http://schemas.microsoft.com/office/drawing/2016/SVG/main" r:embed="rId5"/>
-                </a:ext>
-              </a:extLst>
-            </a:blip>
-            <a:stretch>
-              <a:fillRect/>
-            </a:stretch>
-          </p:blipFill>
-          <p:spPr>
-            <a:xfrm>
-              <a:off x="7714762" y="538448"/>
-              <a:ext cx="2180529" cy="2180529"/>
-            </a:xfrm>
-            <a:prstGeom prst="rect">
-              <a:avLst/>
-            </a:prstGeom>
-          </p:spPr>
-        </p:pic>
         <p:grpSp>
           <p:nvGrpSpPr>
             <p:cNvPr id="58" name="Group 57">
@@ -6454,6 +6860,42 @@
             </p:style>
           </p:cxnSp>
         </p:grpSp>
+        <p:pic>
+          <p:nvPicPr>
+            <p:cNvPr id="66" name="Graphic 65" descr="Fire">
+              <a:extLst>
+                <a:ext uri="{FF2B5EF4-FFF2-40B4-BE49-F238E27FC236}">
+                  <a16:creationId xmlns:a16="http://schemas.microsoft.com/office/drawing/2014/main" id="{C5223906-7770-914A-81D0-2B07D056ABB3}"/>
+                </a:ext>
+              </a:extLst>
+            </p:cNvPr>
+            <p:cNvPicPr>
+              <a:picLocks noChangeAspect="1"/>
+            </p:cNvPicPr>
+            <p:nvPr/>
+          </p:nvPicPr>
+          <p:blipFill>
+            <a:blip r:embed="rId4">
+              <a:extLst>
+                <a:ext uri="{96DAC541-7B7A-43D3-8B79-37D633B846F1}">
+                  <asvg:svgBlip xmlns:asvg="http://schemas.microsoft.com/office/drawing/2016/SVG/main" r:embed="rId5"/>
+                </a:ext>
+              </a:extLst>
+            </a:blip>
+            <a:stretch>
+              <a:fillRect/>
+            </a:stretch>
+          </p:blipFill>
+          <p:spPr>
+            <a:xfrm>
+              <a:off x="7003798" y="-1055164"/>
+              <a:ext cx="3665218" cy="3665218"/>
+            </a:xfrm>
+            <a:prstGeom prst="rect">
+              <a:avLst/>
+            </a:prstGeom>
+          </p:spPr>
+        </p:pic>
       </p:grpSp>
       <p:grpSp>
         <p:nvGrpSpPr>
@@ -7414,9 +7856,9 @@
         <p:grpSpPr>
           <a:xfrm>
             <a:off x="8343328" y="1388265"/>
-            <a:ext cx="3723165" cy="4435701"/>
+            <a:ext cx="3723165" cy="4467672"/>
             <a:chOff x="8343329" y="2467040"/>
-            <a:chExt cx="2817682" cy="3356928"/>
+            <a:chExt cx="2817682" cy="3381124"/>
           </a:xfrm>
         </p:grpSpPr>
         <p:sp>
@@ -7659,7 +8101,7 @@
           </p:blipFill>
           <p:spPr>
             <a:xfrm>
-              <a:off x="8747109" y="3811040"/>
+              <a:off x="8717143" y="3835236"/>
               <a:ext cx="2012928" cy="2012928"/>
             </a:xfrm>
             <a:prstGeom prst="rect">
@@ -7918,7 +8360,7 @@
         </p:blipFill>
         <p:spPr>
           <a:xfrm>
-            <a:off x="9274463" y="2823078"/>
+            <a:off x="9313916" y="2658132"/>
             <a:ext cx="2392673" cy="2183871"/>
           </a:xfrm>
           <a:prstGeom prst="rect">
@@ -8500,10 +8942,10 @@
             <p:nvPr/>
           </p:nvPicPr>
           <p:blipFill>
-            <a:blip r:embed="rId2">
+            <a:blip r:embed="rId3">
               <a:extLst>
                 <a:ext uri="{96DAC541-7B7A-43D3-8B79-37D633B846F1}">
-                  <asvg:svgBlip xmlns:asvg="http://schemas.microsoft.com/office/drawing/2016/SVG/main" r:embed="rId3"/>
+                  <asvg:svgBlip xmlns:asvg="http://schemas.microsoft.com/office/drawing/2016/SVG/main" r:embed="rId4"/>
                 </a:ext>
               </a:extLst>
             </a:blip>
@@ -8536,7 +8978,7 @@
             <p:nvPr/>
           </p:nvPicPr>
           <p:blipFill rotWithShape="1">
-            <a:blip r:embed="rId4"/>
+            <a:blip r:embed="rId5"/>
             <a:srcRect l="50867" r="-706"/>
             <a:stretch/>
           </p:blipFill>
@@ -8571,6 +9013,271 @@
           <a:prstGeom prst="rect">
             <a:avLst/>
           </a:prstGeom>
+        </p:spPr>
+        <p:style>
+          <a:lnRef idx="2">
+            <a:schemeClr val="accent1">
+              <a:shade val="50000"/>
+            </a:schemeClr>
+          </a:lnRef>
+          <a:fillRef idx="1">
+            <a:schemeClr val="accent1"/>
+          </a:fillRef>
+          <a:effectRef idx="0">
+            <a:schemeClr val="accent1"/>
+          </a:effectRef>
+          <a:fontRef idx="minor">
+            <a:schemeClr val="lt1"/>
+          </a:fontRef>
+        </p:style>
+        <p:txBody>
+          <a:bodyPr rtlCol="0" anchor="ctr"/>
+          <a:lstStyle/>
+          <a:p>
+            <a:pPr algn="ctr"/>
+            <a:endParaRPr lang="en-US"/>
+          </a:p>
+        </p:txBody>
+      </p:sp>
+      <p:grpSp>
+        <p:nvGrpSpPr>
+          <p:cNvPr id="3" name="Group 2">
+            <a:extLst>
+              <a:ext uri="{FF2B5EF4-FFF2-40B4-BE49-F238E27FC236}">
+                <a16:creationId xmlns:a16="http://schemas.microsoft.com/office/drawing/2014/main" id="{DE7C9F77-91B2-E048-8714-99396B096C21}"/>
+              </a:ext>
+            </a:extLst>
+          </p:cNvPr>
+          <p:cNvGrpSpPr/>
+          <p:nvPr/>
+        </p:nvGrpSpPr>
+        <p:grpSpPr>
+          <a:xfrm>
+            <a:off x="7595346" y="1359917"/>
+            <a:ext cx="3665218" cy="3665218"/>
+            <a:chOff x="7595346" y="1359917"/>
+            <a:chExt cx="3665218" cy="3665218"/>
+          </a:xfrm>
+        </p:grpSpPr>
+        <p:sp>
+          <p:nvSpPr>
+            <p:cNvPr id="2" name="Oval 1">
+              <a:extLst>
+                <a:ext uri="{FF2B5EF4-FFF2-40B4-BE49-F238E27FC236}">
+                  <a16:creationId xmlns:a16="http://schemas.microsoft.com/office/drawing/2014/main" id="{1E248090-79BE-BF4D-8AF0-45700C7A412A}"/>
+                </a:ext>
+              </a:extLst>
+            </p:cNvPr>
+            <p:cNvSpPr/>
+            <p:nvPr/>
+          </p:nvSpPr>
+          <p:spPr>
+            <a:xfrm>
+              <a:off x="8564816" y="3657600"/>
+              <a:ext cx="1549855" cy="1195753"/>
+            </a:xfrm>
+            <a:prstGeom prst="ellipse">
+              <a:avLst/>
+            </a:prstGeom>
+            <a:solidFill>
+              <a:srgbClr val="F6B759"/>
+            </a:solidFill>
+            <a:ln>
+              <a:noFill/>
+            </a:ln>
+          </p:spPr>
+          <p:style>
+            <a:lnRef idx="2">
+              <a:schemeClr val="accent1">
+                <a:shade val="50000"/>
+              </a:schemeClr>
+            </a:lnRef>
+            <a:fillRef idx="1">
+              <a:schemeClr val="accent1"/>
+            </a:fillRef>
+            <a:effectRef idx="0">
+              <a:schemeClr val="accent1"/>
+            </a:effectRef>
+            <a:fontRef idx="minor">
+              <a:schemeClr val="lt1"/>
+            </a:fontRef>
+          </p:style>
+          <p:txBody>
+            <a:bodyPr rtlCol="0" anchor="ctr"/>
+            <a:lstStyle/>
+            <a:p>
+              <a:pPr algn="ctr"/>
+              <a:endParaRPr lang="en-US"/>
+            </a:p>
+          </p:txBody>
+        </p:sp>
+        <p:sp>
+          <p:nvSpPr>
+            <p:cNvPr id="9" name="Rectangle 8">
+              <a:extLst>
+                <a:ext uri="{FF2B5EF4-FFF2-40B4-BE49-F238E27FC236}">
+                  <a16:creationId xmlns:a16="http://schemas.microsoft.com/office/drawing/2014/main" id="{48C5CF34-69DA-2944-91D6-2FF3AB04E33F}"/>
+                </a:ext>
+              </a:extLst>
+            </p:cNvPr>
+            <p:cNvSpPr/>
+            <p:nvPr/>
+          </p:nvSpPr>
+          <p:spPr>
+            <a:xfrm>
+              <a:off x="8679072" y="3429000"/>
+              <a:ext cx="1060670" cy="1058594"/>
+            </a:xfrm>
+            <a:prstGeom prst="rect">
+              <a:avLst/>
+            </a:prstGeom>
+            <a:solidFill>
+              <a:srgbClr val="F6B759"/>
+            </a:solidFill>
+            <a:ln>
+              <a:noFill/>
+            </a:ln>
+          </p:spPr>
+          <p:style>
+            <a:lnRef idx="2">
+              <a:schemeClr val="accent1">
+                <a:shade val="50000"/>
+              </a:schemeClr>
+            </a:lnRef>
+            <a:fillRef idx="1">
+              <a:schemeClr val="accent1"/>
+            </a:fillRef>
+            <a:effectRef idx="0">
+              <a:schemeClr val="accent1"/>
+            </a:effectRef>
+            <a:fontRef idx="minor">
+              <a:schemeClr val="lt1"/>
+            </a:fontRef>
+          </p:style>
+          <p:txBody>
+            <a:bodyPr rtlCol="0" anchor="ctr"/>
+            <a:lstStyle/>
+            <a:p>
+              <a:pPr algn="ctr"/>
+              <a:endParaRPr lang="en-US"/>
+            </a:p>
+          </p:txBody>
+        </p:sp>
+        <p:pic>
+          <p:nvPicPr>
+            <p:cNvPr id="8" name="Graphic 7" descr="Fire">
+              <a:extLst>
+                <a:ext uri="{FF2B5EF4-FFF2-40B4-BE49-F238E27FC236}">
+                  <a16:creationId xmlns:a16="http://schemas.microsoft.com/office/drawing/2014/main" id="{F6756363-853F-D54E-8956-5ADADF4DA539}"/>
+                </a:ext>
+              </a:extLst>
+            </p:cNvPr>
+            <p:cNvPicPr>
+              <a:picLocks noChangeAspect="1"/>
+            </p:cNvPicPr>
+            <p:nvPr/>
+          </p:nvPicPr>
+          <p:blipFill>
+            <a:blip r:embed="rId3">
+              <a:extLst>
+                <a:ext uri="{96DAC541-7B7A-43D3-8B79-37D633B846F1}">
+                  <asvg:svgBlip xmlns:asvg="http://schemas.microsoft.com/office/drawing/2016/SVG/main" r:embed="rId4"/>
+                </a:ext>
+              </a:extLst>
+            </a:blip>
+            <a:stretch>
+              <a:fillRect/>
+            </a:stretch>
+          </p:blipFill>
+          <p:spPr>
+            <a:xfrm>
+              <a:off x="7595346" y="1359917"/>
+              <a:ext cx="3665218" cy="3665218"/>
+            </a:xfrm>
+            <a:prstGeom prst="rect">
+              <a:avLst/>
+            </a:prstGeom>
+          </p:spPr>
+        </p:pic>
+      </p:grpSp>
+      <p:sp>
+        <p:nvSpPr>
+          <p:cNvPr id="4" name="Oval 3">
+            <a:extLst>
+              <a:ext uri="{FF2B5EF4-FFF2-40B4-BE49-F238E27FC236}">
+                <a16:creationId xmlns:a16="http://schemas.microsoft.com/office/drawing/2014/main" id="{24E6EBEF-4602-1D49-B193-06EF75991CAD}"/>
+              </a:ext>
+            </a:extLst>
+          </p:cNvPr>
+          <p:cNvSpPr/>
+          <p:nvPr/>
+        </p:nvSpPr>
+        <p:spPr>
+          <a:xfrm>
+            <a:off x="9492976" y="2115163"/>
+            <a:ext cx="493531" cy="1552989"/>
+          </a:xfrm>
+          <a:prstGeom prst="ellipse">
+            <a:avLst/>
+          </a:prstGeom>
+          <a:solidFill>
+            <a:srgbClr val="F6B759"/>
+          </a:solidFill>
+          <a:ln>
+            <a:noFill/>
+          </a:ln>
+        </p:spPr>
+        <p:style>
+          <a:lnRef idx="2">
+            <a:schemeClr val="accent1">
+              <a:shade val="50000"/>
+            </a:schemeClr>
+          </a:lnRef>
+          <a:fillRef idx="1">
+            <a:schemeClr val="accent1"/>
+          </a:fillRef>
+          <a:effectRef idx="0">
+            <a:schemeClr val="accent1"/>
+          </a:effectRef>
+          <a:fontRef idx="minor">
+            <a:schemeClr val="lt1"/>
+          </a:fontRef>
+        </p:style>
+        <p:txBody>
+          <a:bodyPr rtlCol="0" anchor="ctr"/>
+          <a:lstStyle/>
+          <a:p>
+            <a:pPr algn="ctr"/>
+            <a:endParaRPr lang="en-US"/>
+          </a:p>
+        </p:txBody>
+      </p:sp>
+      <p:sp>
+        <p:nvSpPr>
+          <p:cNvPr id="14" name="Rectangle 13">
+            <a:extLst>
+              <a:ext uri="{FF2B5EF4-FFF2-40B4-BE49-F238E27FC236}">
+                <a16:creationId xmlns:a16="http://schemas.microsoft.com/office/drawing/2014/main" id="{2F8B2A54-6B0A-0640-B3D6-E994216F6DF5}"/>
+              </a:ext>
+            </a:extLst>
+          </p:cNvPr>
+          <p:cNvSpPr/>
+          <p:nvPr/>
+        </p:nvSpPr>
+        <p:spPr>
+          <a:xfrm>
+            <a:off x="5614483" y="871356"/>
+            <a:ext cx="1060670" cy="763820"/>
+          </a:xfrm>
+          <a:prstGeom prst="rect">
+            <a:avLst/>
+          </a:prstGeom>
+          <a:solidFill>
+            <a:srgbClr val="F6B759"/>
+          </a:solidFill>
+          <a:ln>
+            <a:noFill/>
+          </a:ln>
         </p:spPr>
         <p:style>
           <a:lnRef idx="2">
@@ -8903,4 +9610,299 @@
     </a:ext>
   </a:extLst>
 </a:theme>
+</file>
+
+<file path=ppt/theme/theme2.xml><?xml version="1.0" encoding="utf-8"?>
+<a:theme xmlns:a="http://schemas.openxmlformats.org/drawingml/2006/main" name="Office Theme">
+  <a:themeElements>
+    <a:clrScheme name="Office">
+      <a:dk1>
+        <a:sysClr val="windowText" lastClr="000000"/>
+      </a:dk1>
+      <a:lt1>
+        <a:sysClr val="window" lastClr="FFFFFF"/>
+      </a:lt1>
+      <a:dk2>
+        <a:srgbClr val="44546A"/>
+      </a:dk2>
+      <a:lt2>
+        <a:srgbClr val="E7E6E6"/>
+      </a:lt2>
+      <a:accent1>
+        <a:srgbClr val="4472C4"/>
+      </a:accent1>
+      <a:accent2>
+        <a:srgbClr val="ED7D31"/>
+      </a:accent2>
+      <a:accent3>
+        <a:srgbClr val="A5A5A5"/>
+      </a:accent3>
+      <a:accent4>
+        <a:srgbClr val="FFC000"/>
+      </a:accent4>
+      <a:accent5>
+        <a:srgbClr val="5B9BD5"/>
+      </a:accent5>
+      <a:accent6>
+        <a:srgbClr val="70AD47"/>
+      </a:accent6>
+      <a:hlink>
+        <a:srgbClr val="0563C1"/>
+      </a:hlink>
+      <a:folHlink>
+        <a:srgbClr val="954F72"/>
+      </a:folHlink>
+    </a:clrScheme>
+    <a:fontScheme name="Office">
+      <a:majorFont>
+        <a:latin typeface="Calibri Light" panose="020F0302020204030204"/>
+        <a:ea typeface=""/>
+        <a:cs typeface=""/>
+        <a:font script="Jpan" typeface="游ゴシック Light"/>
+        <a:font script="Hang" typeface="맑은 고딕"/>
+        <a:font script="Hans" typeface="等线 Light"/>
+        <a:font script="Hant" typeface="新細明體"/>
+        <a:font script="Arab" typeface="Times New Roman"/>
+        <a:font script="Hebr" typeface="Times New Roman"/>
+        <a:font script="Thai" typeface="Angsana New"/>
+        <a:font script="Ethi" typeface="Nyala"/>
+        <a:font script="Beng" typeface="Vrinda"/>
+        <a:font script="Gujr" typeface="Shruti"/>
+        <a:font script="Khmr" typeface="MoolBoran"/>
+        <a:font script="Knda" typeface="Tunga"/>
+        <a:font script="Guru" typeface="Raavi"/>
+        <a:font script="Cans" typeface="Euphemia"/>
+        <a:font script="Cher" typeface="Plantagenet Cherokee"/>
+        <a:font script="Yiii" typeface="Microsoft Yi Baiti"/>
+        <a:font script="Tibt" typeface="Microsoft Himalaya"/>
+        <a:font script="Thaa" typeface="MV Boli"/>
+        <a:font script="Deva" typeface="Mangal"/>
+        <a:font script="Telu" typeface="Gautami"/>
+        <a:font script="Taml" typeface="Latha"/>
+        <a:font script="Syrc" typeface="Estrangelo Edessa"/>
+        <a:font script="Orya" typeface="Kalinga"/>
+        <a:font script="Mlym" typeface="Kartika"/>
+        <a:font script="Laoo" typeface="DokChampa"/>
+        <a:font script="Sinh" typeface="Iskoola Pota"/>
+        <a:font script="Mong" typeface="Mongolian Baiti"/>
+        <a:font script="Viet" typeface="Times New Roman"/>
+        <a:font script="Uigh" typeface="Microsoft Uighur"/>
+        <a:font script="Geor" typeface="Sylfaen"/>
+        <a:font script="Armn" typeface="Arial"/>
+        <a:font script="Bugi" typeface="Leelawadee UI"/>
+        <a:font script="Bopo" typeface="Microsoft JhengHei"/>
+        <a:font script="Java" typeface="Javanese Text"/>
+        <a:font script="Lisu" typeface="Segoe UI"/>
+        <a:font script="Mymr" typeface="Myanmar Text"/>
+        <a:font script="Nkoo" typeface="Ebrima"/>
+        <a:font script="Olck" typeface="Nirmala UI"/>
+        <a:font script="Osma" typeface="Ebrima"/>
+        <a:font script="Phag" typeface="Phagspa"/>
+        <a:font script="Syrn" typeface="Estrangelo Edessa"/>
+        <a:font script="Syrj" typeface="Estrangelo Edessa"/>
+        <a:font script="Syre" typeface="Estrangelo Edessa"/>
+        <a:font script="Sora" typeface="Nirmala UI"/>
+        <a:font script="Tale" typeface="Microsoft Tai Le"/>
+        <a:font script="Talu" typeface="Microsoft New Tai Lue"/>
+        <a:font script="Tfng" typeface="Ebrima"/>
+      </a:majorFont>
+      <a:minorFont>
+        <a:latin typeface="Calibri" panose="020F0502020204030204"/>
+        <a:ea typeface=""/>
+        <a:cs typeface=""/>
+        <a:font script="Jpan" typeface="游ゴシック"/>
+        <a:font script="Hang" typeface="맑은 고딕"/>
+        <a:font script="Hans" typeface="等线"/>
+        <a:font script="Hant" typeface="新細明體"/>
+        <a:font script="Arab" typeface="Arial"/>
+        <a:font script="Hebr" typeface="Arial"/>
+        <a:font script="Thai" typeface="Cordia New"/>
+        <a:font script="Ethi" typeface="Nyala"/>
+        <a:font script="Beng" typeface="Vrinda"/>
+        <a:font script="Gujr" typeface="Shruti"/>
+        <a:font script="Khmr" typeface="DaunPenh"/>
+        <a:font script="Knda" typeface="Tunga"/>
+        <a:font script="Guru" typeface="Raavi"/>
+        <a:font script="Cans" typeface="Euphemia"/>
+        <a:font script="Cher" typeface="Plantagenet Cherokee"/>
+        <a:font script="Yiii" typeface="Microsoft Yi Baiti"/>
+        <a:font script="Tibt" typeface="Microsoft Himalaya"/>
+        <a:font script="Thaa" typeface="MV Boli"/>
+        <a:font script="Deva" typeface="Mangal"/>
+        <a:font script="Telu" typeface="Gautami"/>
+        <a:font script="Taml" typeface="Latha"/>
+        <a:font script="Syrc" typeface="Estrangelo Edessa"/>
+        <a:font script="Orya" typeface="Kalinga"/>
+        <a:font script="Mlym" typeface="Kartika"/>
+        <a:font script="Laoo" typeface="DokChampa"/>
+        <a:font script="Sinh" typeface="Iskoola Pota"/>
+        <a:font script="Mong" typeface="Mongolian Baiti"/>
+        <a:font script="Viet" typeface="Arial"/>
+        <a:font script="Uigh" typeface="Microsoft Uighur"/>
+        <a:font script="Geor" typeface="Sylfaen"/>
+        <a:font script="Armn" typeface="Arial"/>
+        <a:font script="Bugi" typeface="Leelawadee UI"/>
+        <a:font script="Bopo" typeface="Microsoft JhengHei"/>
+        <a:font script="Java" typeface="Javanese Text"/>
+        <a:font script="Lisu" typeface="Segoe UI"/>
+        <a:font script="Mymr" typeface="Myanmar Text"/>
+        <a:font script="Nkoo" typeface="Ebrima"/>
+        <a:font script="Olck" typeface="Nirmala UI"/>
+        <a:font script="Osma" typeface="Ebrima"/>
+        <a:font script="Phag" typeface="Phagspa"/>
+        <a:font script="Syrn" typeface="Estrangelo Edessa"/>
+        <a:font script="Syrj" typeface="Estrangelo Edessa"/>
+        <a:font script="Syre" typeface="Estrangelo Edessa"/>
+        <a:font script="Sora" typeface="Nirmala UI"/>
+        <a:font script="Tale" typeface="Microsoft Tai Le"/>
+        <a:font script="Talu" typeface="Microsoft New Tai Lue"/>
+        <a:font script="Tfng" typeface="Ebrima"/>
+      </a:minorFont>
+    </a:fontScheme>
+    <a:fmtScheme name="Office">
+      <a:fillStyleLst>
+        <a:solidFill>
+          <a:schemeClr val="phClr"/>
+        </a:solidFill>
+        <a:gradFill rotWithShape="1">
+          <a:gsLst>
+            <a:gs pos="0">
+              <a:schemeClr val="phClr">
+                <a:lumMod val="110000"/>
+                <a:satMod val="105000"/>
+                <a:tint val="67000"/>
+              </a:schemeClr>
+            </a:gs>
+            <a:gs pos="50000">
+              <a:schemeClr val="phClr">
+                <a:lumMod val="105000"/>
+                <a:satMod val="103000"/>
+                <a:tint val="73000"/>
+              </a:schemeClr>
+            </a:gs>
+            <a:gs pos="100000">
+              <a:schemeClr val="phClr">
+                <a:lumMod val="105000"/>
+                <a:satMod val="109000"/>
+                <a:tint val="81000"/>
+              </a:schemeClr>
+            </a:gs>
+          </a:gsLst>
+          <a:lin ang="5400000" scaled="0"/>
+        </a:gradFill>
+        <a:gradFill rotWithShape="1">
+          <a:gsLst>
+            <a:gs pos="0">
+              <a:schemeClr val="phClr">
+                <a:satMod val="103000"/>
+                <a:lumMod val="102000"/>
+                <a:tint val="94000"/>
+              </a:schemeClr>
+            </a:gs>
+            <a:gs pos="50000">
+              <a:schemeClr val="phClr">
+                <a:satMod val="110000"/>
+                <a:lumMod val="100000"/>
+                <a:shade val="100000"/>
+              </a:schemeClr>
+            </a:gs>
+            <a:gs pos="100000">
+              <a:schemeClr val="phClr">
+                <a:lumMod val="99000"/>
+                <a:satMod val="120000"/>
+                <a:shade val="78000"/>
+              </a:schemeClr>
+            </a:gs>
+          </a:gsLst>
+          <a:lin ang="5400000" scaled="0"/>
+        </a:gradFill>
+      </a:fillStyleLst>
+      <a:lnStyleLst>
+        <a:ln w="6350" cap="flat" cmpd="sng" algn="ctr">
+          <a:solidFill>
+            <a:schemeClr val="phClr"/>
+          </a:solidFill>
+          <a:prstDash val="solid"/>
+          <a:miter lim="800000"/>
+        </a:ln>
+        <a:ln w="12700" cap="flat" cmpd="sng" algn="ctr">
+          <a:solidFill>
+            <a:schemeClr val="phClr"/>
+          </a:solidFill>
+          <a:prstDash val="solid"/>
+          <a:miter lim="800000"/>
+        </a:ln>
+        <a:ln w="19050" cap="flat" cmpd="sng" algn="ctr">
+          <a:solidFill>
+            <a:schemeClr val="phClr"/>
+          </a:solidFill>
+          <a:prstDash val="solid"/>
+          <a:miter lim="800000"/>
+        </a:ln>
+      </a:lnStyleLst>
+      <a:effectStyleLst>
+        <a:effectStyle>
+          <a:effectLst/>
+        </a:effectStyle>
+        <a:effectStyle>
+          <a:effectLst/>
+        </a:effectStyle>
+        <a:effectStyle>
+          <a:effectLst>
+            <a:outerShdw blurRad="57150" dist="19050" dir="5400000" algn="ctr" rotWithShape="0">
+              <a:srgbClr val="000000">
+                <a:alpha val="63000"/>
+              </a:srgbClr>
+            </a:outerShdw>
+          </a:effectLst>
+        </a:effectStyle>
+      </a:effectStyleLst>
+      <a:bgFillStyleLst>
+        <a:solidFill>
+          <a:schemeClr val="phClr"/>
+        </a:solidFill>
+        <a:solidFill>
+          <a:schemeClr val="phClr">
+            <a:tint val="95000"/>
+            <a:satMod val="170000"/>
+          </a:schemeClr>
+        </a:solidFill>
+        <a:gradFill rotWithShape="1">
+          <a:gsLst>
+            <a:gs pos="0">
+              <a:schemeClr val="phClr">
+                <a:tint val="93000"/>
+                <a:satMod val="150000"/>
+                <a:shade val="98000"/>
+                <a:lumMod val="102000"/>
+              </a:schemeClr>
+            </a:gs>
+            <a:gs pos="50000">
+              <a:schemeClr val="phClr">
+                <a:tint val="98000"/>
+                <a:satMod val="130000"/>
+                <a:shade val="90000"/>
+                <a:lumMod val="103000"/>
+              </a:schemeClr>
+            </a:gs>
+            <a:gs pos="100000">
+              <a:schemeClr val="phClr">
+                <a:shade val="63000"/>
+                <a:satMod val="120000"/>
+              </a:schemeClr>
+            </a:gs>
+          </a:gsLst>
+          <a:lin ang="5400000" scaled="0"/>
+        </a:gradFill>
+      </a:bgFillStyleLst>
+    </a:fmtScheme>
+  </a:themeElements>
+  <a:objectDefaults/>
+  <a:extraClrSchemeLst/>
+  <a:extLst>
+    <a:ext uri="{05A4C25C-085E-4340-85A3-A5531E510DB2}">
+      <thm15:themeFamily xmlns:thm15="http://schemas.microsoft.com/office/thememl/2012/main" name="Office Theme" id="{62F939B6-93AF-4DB8-9C6B-D6C7DFDC589F}" vid="{4A3C46E8-61CC-4603-A589-7422A47A8E4A}"/>
+    </a:ext>
+  </a:extLst>
+</a:theme>
 </file>
</xml_diff>